<commit_message>
UI ppt finished.. now this branch will be merged to the master branch
</commit_message>
<xml_diff>
--- a/App_UI_design.pptx
+++ b/App_UI_design.pptx
@@ -9,6 +9,12 @@
     <p:sldId id="258" r:id="rId3"/>
     <p:sldId id="259" r:id="rId4"/>
     <p:sldId id="260" r:id="rId5"/>
+    <p:sldId id="261" r:id="rId6"/>
+    <p:sldId id="263" r:id="rId7"/>
+    <p:sldId id="264" r:id="rId8"/>
+    <p:sldId id="266" r:id="rId9"/>
+    <p:sldId id="267" r:id="rId10"/>
+    <p:sldId id="270" r:id="rId11"/>
   </p:sldIdLst>
   <p:sldSz cx="12192000" cy="6858000"/>
   <p:notesSz cx="6858000" cy="9144000"/>
@@ -115,6 +121,14 @@
 </p:presentation>
 </file>
 
+<file path=ppt/revisionInfo.xml><?xml version="1.0" encoding="utf-8"?>
+<p1510:revInfo xmlns:a="http://schemas.openxmlformats.org/drawingml/2006/main" xmlns:r="http://schemas.openxmlformats.org/officeDocument/2006/relationships" xmlns:p1510="http://schemas.microsoft.com/office/powerpoint/2015/10/main">
+  <p1510:revLst>
+    <p1510:client id="{6560F309-3B74-9264-4141-09F8A7B1A96A}" v="5" dt="2019-06-11T11:19:32.128"/>
+  </p1510:revLst>
+</p1510:revInfo>
+</file>
+
 <file path=ppt/slideLayouts/slideLayout1.xml><?xml version="1.0" encoding="utf-8"?>
 <p:sldLayout xmlns:a="http://schemas.openxmlformats.org/drawingml/2006/main" xmlns:r="http://schemas.openxmlformats.org/officeDocument/2006/relationships" xmlns:p="http://schemas.openxmlformats.org/presentationml/2006/main" type="title" preserve="1">
   <p:cSld name="Title Slide">
@@ -246,7 +260,7 @@
           <a:p>
             <a:fld id="{846CE7D5-CF57-46EF-B807-FDD0502418D4}" type="datetimeFigureOut">
               <a:rPr lang="en-US" smtClean="0"/>
-              <a:t>6/10/2019</a:t>
+              <a:t>6/11/2019</a:t>
             </a:fld>
             <a:endParaRPr lang="en-US"/>
           </a:p>
@@ -416,7 +430,7 @@
           <a:p>
             <a:fld id="{846CE7D5-CF57-46EF-B807-FDD0502418D4}" type="datetimeFigureOut">
               <a:rPr lang="en-US" smtClean="0"/>
-              <a:t>6/10/2019</a:t>
+              <a:t>6/11/2019</a:t>
             </a:fld>
             <a:endParaRPr lang="en-US"/>
           </a:p>
@@ -596,7 +610,7 @@
           <a:p>
             <a:fld id="{846CE7D5-CF57-46EF-B807-FDD0502418D4}" type="datetimeFigureOut">
               <a:rPr lang="en-US" smtClean="0"/>
-              <a:t>6/10/2019</a:t>
+              <a:t>6/11/2019</a:t>
             </a:fld>
             <a:endParaRPr lang="en-US"/>
           </a:p>
@@ -766,7 +780,7 @@
           <a:p>
             <a:fld id="{846CE7D5-CF57-46EF-B807-FDD0502418D4}" type="datetimeFigureOut">
               <a:rPr lang="en-US" smtClean="0"/>
-              <a:t>6/10/2019</a:t>
+              <a:t>6/11/2019</a:t>
             </a:fld>
             <a:endParaRPr lang="en-US"/>
           </a:p>
@@ -1012,7 +1026,7 @@
           <a:p>
             <a:fld id="{846CE7D5-CF57-46EF-B807-FDD0502418D4}" type="datetimeFigureOut">
               <a:rPr lang="en-US" smtClean="0"/>
-              <a:t>6/10/2019</a:t>
+              <a:t>6/11/2019</a:t>
             </a:fld>
             <a:endParaRPr lang="en-US"/>
           </a:p>
@@ -1244,7 +1258,7 @@
           <a:p>
             <a:fld id="{846CE7D5-CF57-46EF-B807-FDD0502418D4}" type="datetimeFigureOut">
               <a:rPr lang="en-US" smtClean="0"/>
-              <a:t>6/10/2019</a:t>
+              <a:t>6/11/2019</a:t>
             </a:fld>
             <a:endParaRPr lang="en-US"/>
           </a:p>
@@ -1611,7 +1625,7 @@
           <a:p>
             <a:fld id="{846CE7D5-CF57-46EF-B807-FDD0502418D4}" type="datetimeFigureOut">
               <a:rPr lang="en-US" smtClean="0"/>
-              <a:t>6/10/2019</a:t>
+              <a:t>6/11/2019</a:t>
             </a:fld>
             <a:endParaRPr lang="en-US"/>
           </a:p>
@@ -1729,7 +1743,7 @@
           <a:p>
             <a:fld id="{846CE7D5-CF57-46EF-B807-FDD0502418D4}" type="datetimeFigureOut">
               <a:rPr lang="en-US" smtClean="0"/>
-              <a:t>6/10/2019</a:t>
+              <a:t>6/11/2019</a:t>
             </a:fld>
             <a:endParaRPr lang="en-US"/>
           </a:p>
@@ -1824,7 +1838,7 @@
           <a:p>
             <a:fld id="{846CE7D5-CF57-46EF-B807-FDD0502418D4}" type="datetimeFigureOut">
               <a:rPr lang="en-US" smtClean="0"/>
-              <a:t>6/10/2019</a:t>
+              <a:t>6/11/2019</a:t>
             </a:fld>
             <a:endParaRPr lang="en-US"/>
           </a:p>
@@ -2101,7 +2115,7 @@
           <a:p>
             <a:fld id="{846CE7D5-CF57-46EF-B807-FDD0502418D4}" type="datetimeFigureOut">
               <a:rPr lang="en-US" smtClean="0"/>
-              <a:t>6/10/2019</a:t>
+              <a:t>6/11/2019</a:t>
             </a:fld>
             <a:endParaRPr lang="en-US"/>
           </a:p>
@@ -2358,7 +2372,7 @@
           <a:p>
             <a:fld id="{846CE7D5-CF57-46EF-B807-FDD0502418D4}" type="datetimeFigureOut">
               <a:rPr lang="en-US" smtClean="0"/>
-              <a:t>6/10/2019</a:t>
+              <a:t>6/11/2019</a:t>
             </a:fld>
             <a:endParaRPr lang="en-US"/>
           </a:p>
@@ -2571,7 +2585,7 @@
           <a:p>
             <a:fld id="{846CE7D5-CF57-46EF-B807-FDD0502418D4}" type="datetimeFigureOut">
               <a:rPr lang="en-US" smtClean="0"/>
-              <a:t>6/10/2019</a:t>
+              <a:t>6/11/2019</a:t>
             </a:fld>
             <a:endParaRPr lang="en-US"/>
           </a:p>
@@ -2997,12 +3011,12 @@
           <a:lstStyle/>
           <a:p>
             <a:r>
-              <a:rPr lang="en-US" dirty="0" err="1">
+              <a:rPr lang="en-US">
                 <a:cs typeface="Calibri Light"/>
               </a:rPr>
-              <a:t>Technonia_I_app</a:t>
-            </a:r>
-            <a:endParaRPr lang="en-US" dirty="0" err="1"/>
+              <a:t>Technonia_i_app</a:t>
+            </a:r>
+            <a:endParaRPr lang="en-US"/>
           </a:p>
         </p:txBody>
       </p:sp>
@@ -3055,6 +3069,250 @@
     <p:extLst>
       <p:ext uri="{BB962C8B-B14F-4D97-AF65-F5344CB8AC3E}">
         <p14:creationId xmlns:p14="http://schemas.microsoft.com/office/powerpoint/2010/main" val="109857222"/>
+      </p:ext>
+    </p:extLst>
+  </p:cSld>
+  <p:clrMapOvr>
+    <a:masterClrMapping/>
+  </p:clrMapOvr>
+</p:sld>
+</file>
+
+<file path=ppt/slides/slide10.xml><?xml version="1.0" encoding="utf-8"?>
+<p:sld xmlns:a="http://schemas.openxmlformats.org/drawingml/2006/main" xmlns:r="http://schemas.openxmlformats.org/officeDocument/2006/relationships" xmlns:p="http://schemas.openxmlformats.org/presentationml/2006/main">
+  <p:cSld>
+    <p:spTree>
+      <p:nvGrpSpPr>
+        <p:cNvPr id="1" name=""/>
+        <p:cNvGrpSpPr/>
+        <p:nvPr/>
+      </p:nvGrpSpPr>
+      <p:grpSpPr>
+        <a:xfrm>
+          <a:off x="0" y="0"/>
+          <a:ext cx="0" cy="0"/>
+          <a:chOff x="0" y="0"/>
+          <a:chExt cx="0" cy="0"/>
+        </a:xfrm>
+      </p:grpSpPr>
+      <p:sp>
+        <p:nvSpPr>
+          <p:cNvPr id="2" name="Title 1">
+            <a:extLst>
+              <a:ext uri="{FF2B5EF4-FFF2-40B4-BE49-F238E27FC236}">
+                <a16:creationId xmlns:a16="http://schemas.microsoft.com/office/drawing/2014/main" id="{168B7912-550B-441E-A661-7BBBAC33E258}"/>
+              </a:ext>
+            </a:extLst>
+          </p:cNvPr>
+          <p:cNvSpPr>
+            <a:spLocks noGrp="1"/>
+          </p:cNvSpPr>
+          <p:nvPr>
+            <p:ph type="title"/>
+          </p:nvPr>
+        </p:nvSpPr>
+        <p:spPr/>
+        <p:txBody>
+          <a:bodyPr/>
+          <a:lstStyle/>
+          <a:p>
+            <a:r>
+              <a:rPr lang="en-US">
+                <a:cs typeface="Calibri Light"/>
+              </a:rPr>
+              <a:t>Other components</a:t>
+            </a:r>
+            <a:endParaRPr lang="en-US"/>
+          </a:p>
+        </p:txBody>
+      </p:sp>
+      <p:sp>
+        <p:nvSpPr>
+          <p:cNvPr id="3" name="Content Placeholder 2">
+            <a:extLst>
+              <a:ext uri="{FF2B5EF4-FFF2-40B4-BE49-F238E27FC236}">
+                <a16:creationId xmlns:a16="http://schemas.microsoft.com/office/drawing/2014/main" id="{1B71E191-4603-48E2-8F26-57687946DCB8}"/>
+              </a:ext>
+            </a:extLst>
+          </p:cNvPr>
+          <p:cNvSpPr>
+            <a:spLocks noGrp="1"/>
+          </p:cNvSpPr>
+          <p:nvPr>
+            <p:ph idx="1"/>
+          </p:nvPr>
+        </p:nvSpPr>
+        <p:spPr/>
+        <p:txBody>
+          <a:bodyPr vert="horz" lIns="91440" tIns="45720" rIns="91440" bIns="45720" rtlCol="0" anchor="t">
+            <a:normAutofit fontScale="92500" lnSpcReduction="10000"/>
+          </a:bodyPr>
+          <a:lstStyle/>
+          <a:p>
+            <a:r>
+              <a:rPr lang="en-US">
+                <a:cs typeface="Calibri"/>
+              </a:rPr>
+              <a:t>Device Screen</a:t>
+            </a:r>
+            <a:r>
+              <a:rPr lang="ko-KR" altLang="en-US">
+                <a:ea typeface="맑은 고딕"/>
+                <a:cs typeface="Calibri"/>
+              </a:rPr>
+              <a:t>은</a:t>
+            </a:r>
+            <a:r>
+              <a:rPr lang="en-US" dirty="0">
+                <a:cs typeface="Calibri"/>
+              </a:rPr>
+              <a:t> </a:t>
+            </a:r>
+            <a:r>
+              <a:rPr lang="ko-KR" altLang="en-US">
+                <a:ea typeface="맑은 고딕"/>
+                <a:cs typeface="Calibri"/>
+              </a:rPr>
+              <a:t>기기의</a:t>
+            </a:r>
+            <a:r>
+              <a:rPr lang="en-US" dirty="0">
+                <a:cs typeface="Calibri"/>
+              </a:rPr>
+              <a:t> </a:t>
+            </a:r>
+            <a:r>
+              <a:rPr lang="ko-KR" altLang="en-US">
+                <a:ea typeface="맑은 고딕"/>
+                <a:cs typeface="Calibri"/>
+              </a:rPr>
+              <a:t>세부</a:t>
+            </a:r>
+            <a:r>
+              <a:rPr lang="en-US" dirty="0">
+                <a:cs typeface="Calibri"/>
+              </a:rPr>
+              <a:t> </a:t>
+            </a:r>
+            <a:r>
+              <a:rPr lang="ko-KR" altLang="en-US">
+                <a:ea typeface="맑은 고딕"/>
+                <a:cs typeface="Calibri"/>
+              </a:rPr>
+              <a:t>정보나</a:t>
+            </a:r>
+            <a:r>
+              <a:rPr lang="en-US" dirty="0">
+                <a:cs typeface="Calibri"/>
+              </a:rPr>
+              <a:t> </a:t>
+            </a:r>
+            <a:r>
+              <a:rPr lang="ko-KR" altLang="en-US">
+                <a:ea typeface="맑은 고딕"/>
+                <a:cs typeface="Calibri"/>
+              </a:rPr>
+              <a:t>설정</a:t>
+            </a:r>
+            <a:r>
+              <a:rPr lang="en-US" dirty="0">
+                <a:cs typeface="Calibri"/>
+              </a:rPr>
+              <a:t> </a:t>
+            </a:r>
+            <a:r>
+              <a:rPr lang="ko-KR" altLang="en-US">
+                <a:ea typeface="맑은 고딕"/>
+                <a:cs typeface="Calibri"/>
+              </a:rPr>
+              <a:t>등과</a:t>
+            </a:r>
+            <a:r>
+              <a:rPr lang="en-US" dirty="0">
+                <a:cs typeface="Calibri"/>
+              </a:rPr>
+              <a:t> </a:t>
+            </a:r>
+            <a:r>
+              <a:rPr lang="ko-KR" altLang="en-US">
+                <a:ea typeface="맑은 고딕"/>
+                <a:cs typeface="Calibri"/>
+              </a:rPr>
+              <a:t>관련된</a:t>
+            </a:r>
+            <a:r>
+              <a:rPr lang="en-US" dirty="0">
+                <a:cs typeface="Calibri"/>
+              </a:rPr>
+              <a:t> </a:t>
+            </a:r>
+            <a:r>
+              <a:rPr lang="ko-KR" altLang="en-US">
+                <a:ea typeface="맑은 고딕"/>
+                <a:cs typeface="Calibri"/>
+              </a:rPr>
+              <a:t>페이지</a:t>
+            </a:r>
+          </a:p>
+          <a:p>
+            <a:r>
+              <a:rPr lang="ko-KR" altLang="en-US">
+                <a:ea typeface="맑은 고딕"/>
+                <a:cs typeface="Calibri"/>
+              </a:rPr>
+              <a:t>로그인이나 회원 가입 페이지 역시 필요</a:t>
+            </a:r>
+          </a:p>
+          <a:p>
+            <a:r>
+              <a:rPr lang="ko-KR" altLang="en-US">
+                <a:ea typeface="맑은 고딕"/>
+                <a:cs typeface="Calibri"/>
+              </a:rPr>
+              <a:t>회원 가입 페이지에는 아이디, 비밀번호, 이름, 전화번호 정도를 요구할 듯</a:t>
+            </a:r>
+            <a:endParaRPr lang="ko-KR" altLang="en-US" dirty="0">
+              <a:ea typeface="맑은 고딕"/>
+              <a:cs typeface="Calibri"/>
+            </a:endParaRPr>
+          </a:p>
+          <a:p>
+            <a:r>
+              <a:rPr lang="ko-KR" altLang="en-US">
+                <a:ea typeface="맑은 고딕"/>
+                <a:cs typeface="Calibri"/>
+              </a:rPr>
+              <a:t>Profile Screen에서 새로운 기기를 추가하기 위한 버튼이 화면 하단에 추가될 듯. 이는 추후에 변경될 수도 있음.</a:t>
+            </a:r>
+          </a:p>
+          <a:p>
+            <a:r>
+              <a:rPr lang="ko-KR" altLang="en-US">
+                <a:ea typeface="맑은 고딕"/>
+                <a:cs typeface="Calibri"/>
+              </a:rPr>
+              <a:t>Radioactive Graph Screen에서 애니메이션 기능등을 위해서 부채꼴 형태의 차트 이미지가 텅 빈 차트에서부터 꽉 찬 차트의 이미지까지 모두 필요.</a:t>
+            </a:r>
+          </a:p>
+          <a:p>
+            <a:r>
+              <a:rPr lang="ko-KR" altLang="en-US">
+                <a:ea typeface="맑은 고딕"/>
+                <a:cs typeface="Calibri"/>
+              </a:rPr>
+              <a:t>Technonia_i 앱에 사용할 로고가 필요. Profile Screen이나 로그인, 회원 가입 페이지 등에서 사용될 예정.</a:t>
+            </a:r>
+            <a:endParaRPr lang="ko-KR" altLang="en-US" dirty="0">
+              <a:ea typeface="맑은 고딕"/>
+              <a:cs typeface="Calibri"/>
+            </a:endParaRPr>
+          </a:p>
+        </p:txBody>
+      </p:sp>
+    </p:spTree>
+    <p:extLst>
+      <p:ext uri="{BB962C8B-B14F-4D97-AF65-F5344CB8AC3E}">
+        <p14:creationId xmlns:p14="http://schemas.microsoft.com/office/powerpoint/2010/main" val="3641680092"/>
       </p:ext>
     </p:extLst>
   </p:cSld>
@@ -4195,27 +4453,7 @@
                 <a:ea typeface="맑은 고딕"/>
                 <a:cs typeface="Calibri"/>
               </a:rPr>
-              <a:t> "</a:t>
-            </a:r>
-            <a:r>
-              <a:rPr lang="en-US" altLang="ko-KR" sz="1100" dirty="0" err="1">
-                <a:solidFill>
-                  <a:schemeClr val="bg1"/>
-                </a:solidFill>
-                <a:ea typeface="맑은 고딕"/>
-                <a:cs typeface="Calibri"/>
-              </a:rPr>
-              <a:t>Raioactive</a:t>
-            </a:r>
-            <a:r>
-              <a:rPr lang="en-US" altLang="ko-KR" sz="1100" dirty="0">
-                <a:solidFill>
-                  <a:schemeClr val="bg1"/>
-                </a:solidFill>
-                <a:ea typeface="맑은 고딕"/>
-                <a:cs typeface="Calibri"/>
-              </a:rPr>
-              <a:t> Ray Graph </a:t>
+              <a:t> "Radioactive Ray Graph </a:t>
             </a:r>
             <a:r>
               <a:rPr lang="en-US" altLang="ko-KR" sz="1100" dirty="0" err="1">
@@ -4270,7 +4508,7 @@
         </p:nvSpPr>
         <p:spPr>
           <a:xfrm>
-            <a:off x="1033826" y="4238135"/>
+            <a:off x="859392" y="3623027"/>
             <a:ext cx="2784230" cy="918307"/>
           </a:xfrm>
           <a:prstGeom prst="roundRect">
@@ -4316,7 +4554,7 @@
         </p:nvSpPr>
         <p:spPr>
           <a:xfrm>
-            <a:off x="1258764" y="4433765"/>
+            <a:off x="1084330" y="3818657"/>
             <a:ext cx="2313353" cy="600164"/>
           </a:xfrm>
           <a:prstGeom prst="rect">
@@ -4465,9 +4703,9 @@
           <p:nvPr/>
         </p:nvCxnSpPr>
         <p:spPr>
-          <a:xfrm flipH="1">
-            <a:off x="3816594" y="4856039"/>
-            <a:ext cx="6236676" cy="15631"/>
+          <a:xfrm flipH="1" flipV="1">
+            <a:off x="3669703" y="4100490"/>
+            <a:ext cx="6374387" cy="783091"/>
           </a:xfrm>
           <a:prstGeom prst="straightConnector1">
             <a:avLst/>
@@ -4505,7 +4743,7 @@
         </p:nvSpPr>
         <p:spPr>
           <a:xfrm>
-            <a:off x="1100015" y="5789246"/>
+            <a:off x="1476424" y="5339391"/>
             <a:ext cx="3329352" cy="738664"/>
           </a:xfrm>
           <a:prstGeom prst="rect">
@@ -4600,7 +4838,7 @@
       </p:grpSpPr>
       <p:sp>
         <p:nvSpPr>
-          <p:cNvPr id="8" name="Rectangle 7">
+          <p:cNvPr id="17" name="Rectangle 16">
             <a:extLst>
               <a:ext uri="{FF2B5EF4-FFF2-40B4-BE49-F238E27FC236}">
                 <a16:creationId xmlns:a16="http://schemas.microsoft.com/office/drawing/2014/main" id="{35555856-9970-4BC3-9AA9-6A917F53AFBD}"/>
@@ -4686,7 +4924,7 @@
       </p:sp>
       <p:pic>
         <p:nvPicPr>
-          <p:cNvPr id="10" name="Picture 9">
+          <p:cNvPr id="19" name="Picture 18">
             <a:extLst>
               <a:ext uri="{FF2B5EF4-FFF2-40B4-BE49-F238E27FC236}">
                 <a16:creationId xmlns:a16="http://schemas.microsoft.com/office/drawing/2014/main" id="{7F487851-BFAF-46D8-A1ED-50CAD6E46F59}"/>
@@ -4758,27 +4996,22 @@
           <a:lstStyle/>
           <a:p>
             <a:r>
-              <a:rPr lang="en-US" dirty="0">
+              <a:rPr lang="en-US" sz="4100" kern="1200">
                 <a:solidFill>
                   <a:srgbClr val="000000"/>
                 </a:solidFill>
+                <a:latin typeface="+mj-lt"/>
+                <a:ea typeface="+mj-ea"/>
+                <a:cs typeface="+mj-cs"/>
               </a:rPr>
-              <a:t>Device Screen</a:t>
-            </a:r>
-            <a:endParaRPr lang="en-US" kern="1200" dirty="0">
-              <a:solidFill>
-                <a:srgbClr val="000000"/>
-              </a:solidFill>
-              <a:latin typeface="+mj-lt"/>
-              <a:ea typeface="+mj-ea"/>
-              <a:cs typeface="+mj-cs"/>
-            </a:endParaRPr>
-          </a:p>
-        </p:txBody>
-      </p:sp>
-      <p:sp>
-        <p:nvSpPr>
-          <p:cNvPr id="12" name="Freeform 50">
+              <a:t>Temperature Graph Screen</a:t>
+            </a:r>
+          </a:p>
+        </p:txBody>
+      </p:sp>
+      <p:sp>
+        <p:nvSpPr>
+          <p:cNvPr id="21" name="Freeform 50">
             <a:extLst>
               <a:ext uri="{FF2B5EF4-FFF2-40B4-BE49-F238E27FC236}">
                 <a16:creationId xmlns:a16="http://schemas.microsoft.com/office/drawing/2014/main" id="{13722DD7-BA73-4776-93A3-94491FEF7260}"/>
@@ -4976,10 +5209,10 @@
       </p:sp>
       <p:pic>
         <p:nvPicPr>
-          <p:cNvPr id="3" name="Picture 3" descr="A screenshot of a cell phone&#10;&#10;Description generated with very high confidence">
+          <p:cNvPr id="4" name="Picture 4">
             <a:extLst>
               <a:ext uri="{FF2B5EF4-FFF2-40B4-BE49-F238E27FC236}">
-                <a16:creationId xmlns:a16="http://schemas.microsoft.com/office/drawing/2014/main" id="{A0A1F620-1CED-4501-9361-6ACDC511789E}"/>
+                <a16:creationId xmlns:a16="http://schemas.microsoft.com/office/drawing/2014/main" id="{3C14A334-A609-4515-AB73-A6A0C8C0DC43}"/>
               </a:ext>
             </a:extLst>
           </p:cNvPr>
@@ -4996,8 +5229,8 @@
         </p:blipFill>
         <p:spPr>
           <a:xfrm>
-            <a:off x="8655398" y="1697277"/>
-            <a:ext cx="2250503" cy="4377846"/>
+            <a:off x="8653355" y="1697277"/>
+            <a:ext cx="2254590" cy="4377846"/>
           </a:xfrm>
           <a:prstGeom prst="rect">
             <a:avLst/>
@@ -5008,6 +5241,2742 @@
     <p:extLst>
       <p:ext uri="{BB962C8B-B14F-4D97-AF65-F5344CB8AC3E}">
         <p14:creationId xmlns:p14="http://schemas.microsoft.com/office/powerpoint/2010/main" val="3819335127"/>
+      </p:ext>
+    </p:extLst>
+  </p:cSld>
+  <p:clrMapOvr>
+    <a:masterClrMapping/>
+  </p:clrMapOvr>
+</p:sld>
+</file>
+
+<file path=ppt/slides/slide5.xml><?xml version="1.0" encoding="utf-8"?>
+<p:sld xmlns:a="http://schemas.openxmlformats.org/drawingml/2006/main" xmlns:r="http://schemas.openxmlformats.org/officeDocument/2006/relationships" xmlns:p="http://schemas.openxmlformats.org/presentationml/2006/main">
+  <p:cSld>
+    <p:bg>
+      <p:bgPr>
+        <a:solidFill>
+          <a:schemeClr val="bg1"/>
+        </a:solidFill>
+        <a:effectLst/>
+      </p:bgPr>
+    </p:bg>
+    <p:spTree>
+      <p:nvGrpSpPr>
+        <p:cNvPr id="1" name=""/>
+        <p:cNvGrpSpPr/>
+        <p:nvPr/>
+      </p:nvGrpSpPr>
+      <p:grpSpPr>
+        <a:xfrm>
+          <a:off x="0" y="0"/>
+          <a:ext cx="0" cy="0"/>
+          <a:chOff x="0" y="0"/>
+          <a:chExt cx="0" cy="0"/>
+        </a:xfrm>
+      </p:grpSpPr>
+      <p:sp>
+        <p:nvSpPr>
+          <p:cNvPr id="17" name="Rectangle 16">
+            <a:extLst>
+              <a:ext uri="{FF2B5EF4-FFF2-40B4-BE49-F238E27FC236}">
+                <a16:creationId xmlns:a16="http://schemas.microsoft.com/office/drawing/2014/main" id="{35555856-9970-4BC3-9AA9-6A917F53AFBD}"/>
+              </a:ext>
+              <a:ext uri="{C183D7F6-B498-43B3-948B-1728B52AA6E4}">
+                <adec:decorative xmlns:adec="http://schemas.microsoft.com/office/drawing/2017/decorative" val="1"/>
+              </a:ext>
+            </a:extLst>
+          </p:cNvPr>
+          <p:cNvSpPr>
+            <a:spLocks noGrp="1" noRot="1" noChangeAspect="1" noMove="1" noResize="1" noEditPoints="1" noAdjustHandles="1" noChangeArrowheads="1" noChangeShapeType="1" noTextEdit="1"/>
+          </p:cNvSpPr>
+          <p:nvPr>
+            <p:extLst>
+              <p:ext uri="{386F3935-93C4-4BCD-93E2-E3B085C9AB24}">
+                <p16:designElem xmlns:p16="http://schemas.microsoft.com/office/powerpoint/2015/main" val="1"/>
+              </p:ext>
+            </p:extLst>
+          </p:nvPr>
+        </p:nvSpPr>
+        <p:spPr>
+          <a:xfrm>
+            <a:off x="5769972" y="0"/>
+            <a:ext cx="6421721" cy="6858000"/>
+          </a:xfrm>
+          <a:prstGeom prst="rect">
+            <a:avLst/>
+          </a:prstGeom>
+          <a:gradFill>
+            <a:gsLst>
+              <a:gs pos="0">
+                <a:schemeClr val="accent1">
+                  <a:lumMod val="100000"/>
+                  <a:alpha val="82000"/>
+                </a:schemeClr>
+              </a:gs>
+              <a:gs pos="25000">
+                <a:schemeClr val="accent1">
+                  <a:alpha val="60000"/>
+                </a:schemeClr>
+              </a:gs>
+              <a:gs pos="94000">
+                <a:schemeClr val="bg2">
+                  <a:lumMod val="75000"/>
+                </a:schemeClr>
+              </a:gs>
+              <a:gs pos="100000">
+                <a:schemeClr val="bg2">
+                  <a:lumMod val="75000"/>
+                </a:schemeClr>
+              </a:gs>
+            </a:gsLst>
+            <a:lin ang="4200000" scaled="0"/>
+          </a:gradFill>
+          <a:ln>
+            <a:noFill/>
+          </a:ln>
+        </p:spPr>
+        <p:style>
+          <a:lnRef idx="2">
+            <a:schemeClr val="accent1">
+              <a:shade val="50000"/>
+            </a:schemeClr>
+          </a:lnRef>
+          <a:fillRef idx="1">
+            <a:schemeClr val="accent1"/>
+          </a:fillRef>
+          <a:effectRef idx="0">
+            <a:schemeClr val="accent1"/>
+          </a:effectRef>
+          <a:fontRef idx="minor">
+            <a:schemeClr val="lt1"/>
+          </a:fontRef>
+        </p:style>
+        <p:txBody>
+          <a:bodyPr rtlCol="0" anchor="ctr"/>
+          <a:lstStyle/>
+          <a:p>
+            <a:pPr algn="ctr"/>
+            <a:endParaRPr lang="en-US"/>
+          </a:p>
+        </p:txBody>
+      </p:sp>
+      <p:pic>
+        <p:nvPicPr>
+          <p:cNvPr id="19" name="Picture 18">
+            <a:extLst>
+              <a:ext uri="{FF2B5EF4-FFF2-40B4-BE49-F238E27FC236}">
+                <a16:creationId xmlns:a16="http://schemas.microsoft.com/office/drawing/2014/main" id="{7F487851-BFAF-46D8-A1ED-50CAD6E46F59}"/>
+              </a:ext>
+              <a:ext uri="{C183D7F6-B498-43B3-948B-1728B52AA6E4}">
+                <adec:decorative xmlns:adec="http://schemas.microsoft.com/office/drawing/2017/decorative" val="1"/>
+              </a:ext>
+            </a:extLst>
+          </p:cNvPr>
+          <p:cNvPicPr>
+            <a:picLocks noGrp="1" noRot="1" noChangeAspect="1" noMove="1" noResize="1" noEditPoints="1" noAdjustHandles="1" noChangeArrowheads="1" noChangeShapeType="1" noCrop="1"/>
+          </p:cNvPicPr>
+          <p:nvPr>
+            <p:extLst>
+              <p:ext uri="{386F3935-93C4-4BCD-93E2-E3B085C9AB24}">
+                <p16:designElem xmlns:p16="http://schemas.microsoft.com/office/powerpoint/2015/main" val="1"/>
+              </p:ext>
+            </p:extLst>
+          </p:nvPr>
+        </p:nvPicPr>
+        <p:blipFill>
+          <a:blip r:embed="rId2">
+            <a:extLst>
+              <a:ext uri="{28A0092B-C50C-407E-A947-70E740481C1C}">
+                <a14:useLocalDpi xmlns:a14="http://schemas.microsoft.com/office/drawing/2010/main" val="0"/>
+              </a:ext>
+            </a:extLst>
+          </a:blip>
+          <a:stretch>
+            <a:fillRect/>
+          </a:stretch>
+        </p:blipFill>
+        <p:spPr>
+          <a:xfrm flipH="1">
+            <a:off x="0" y="0"/>
+            <a:ext cx="12192000" cy="6858000"/>
+          </a:xfrm>
+          <a:prstGeom prst="rect">
+            <a:avLst/>
+          </a:prstGeom>
+        </p:spPr>
+      </p:pic>
+      <p:sp>
+        <p:nvSpPr>
+          <p:cNvPr id="21" name="Freeform 50">
+            <a:extLst>
+              <a:ext uri="{FF2B5EF4-FFF2-40B4-BE49-F238E27FC236}">
+                <a16:creationId xmlns:a16="http://schemas.microsoft.com/office/drawing/2014/main" id="{13722DD7-BA73-4776-93A3-94491FEF7260}"/>
+              </a:ext>
+              <a:ext uri="{C183D7F6-B498-43B3-948B-1728B52AA6E4}">
+                <adec:decorative xmlns:adec="http://schemas.microsoft.com/office/drawing/2017/decorative" val="1"/>
+              </a:ext>
+            </a:extLst>
+          </p:cNvPr>
+          <p:cNvSpPr>
+            <a:spLocks noGrp="1" noRot="1" noChangeAspect="1" noMove="1" noResize="1" noEditPoints="1" noAdjustHandles="1" noChangeArrowheads="1" noChangeShapeType="1" noTextEdit="1"/>
+          </p:cNvSpPr>
+          <p:nvPr>
+            <p:extLst>
+              <p:ext uri="{386F3935-93C4-4BCD-93E2-E3B085C9AB24}">
+                <p16:designElem xmlns:p16="http://schemas.microsoft.com/office/powerpoint/2015/main" val="1"/>
+              </p:ext>
+            </p:extLst>
+          </p:nvPr>
+        </p:nvSpPr>
+        <p:spPr>
+          <a:xfrm>
+            <a:off x="6727121" y="581159"/>
+            <a:ext cx="5464879" cy="6276841"/>
+          </a:xfrm>
+          <a:custGeom>
+            <a:avLst/>
+            <a:gdLst>
+              <a:gd name="connsiteX0" fmla="*/ 3299930 w 5464879"/>
+              <a:gd name="connsiteY0" fmla="*/ 0 h 6276841"/>
+              <a:gd name="connsiteX1" fmla="*/ 5398992 w 5464879"/>
+              <a:gd name="connsiteY1" fmla="*/ 753544 h 6276841"/>
+              <a:gd name="connsiteX2" fmla="*/ 5464879 w 5464879"/>
+              <a:gd name="connsiteY2" fmla="*/ 813426 h 6276841"/>
+              <a:gd name="connsiteX3" fmla="*/ 5464879 w 5464879"/>
+              <a:gd name="connsiteY3" fmla="*/ 5786434 h 6276841"/>
+              <a:gd name="connsiteX4" fmla="*/ 5398992 w 5464879"/>
+              <a:gd name="connsiteY4" fmla="*/ 5846317 h 6276841"/>
+              <a:gd name="connsiteX5" fmla="*/ 4872873 w 5464879"/>
+              <a:gd name="connsiteY5" fmla="*/ 6201577 h 6276841"/>
+              <a:gd name="connsiteX6" fmla="*/ 4716632 w 5464879"/>
+              <a:gd name="connsiteY6" fmla="*/ 6276841 h 6276841"/>
+              <a:gd name="connsiteX7" fmla="*/ 1883227 w 5464879"/>
+              <a:gd name="connsiteY7" fmla="*/ 6276841 h 6276841"/>
+              <a:gd name="connsiteX8" fmla="*/ 1726987 w 5464879"/>
+              <a:gd name="connsiteY8" fmla="*/ 6201577 h 6276841"/>
+              <a:gd name="connsiteX9" fmla="*/ 0 w 5464879"/>
+              <a:gd name="connsiteY9" fmla="*/ 3299930 h 6276841"/>
+              <a:gd name="connsiteX10" fmla="*/ 3299930 w 5464879"/>
+              <a:gd name="connsiteY10" fmla="*/ 0 h 6276841"/>
+            </a:gdLst>
+            <a:ahLst/>
+            <a:cxnLst>
+              <a:cxn ang="0">
+                <a:pos x="connsiteX0" y="connsiteY0"/>
+              </a:cxn>
+              <a:cxn ang="0">
+                <a:pos x="connsiteX1" y="connsiteY1"/>
+              </a:cxn>
+              <a:cxn ang="0">
+                <a:pos x="connsiteX2" y="connsiteY2"/>
+              </a:cxn>
+              <a:cxn ang="0">
+                <a:pos x="connsiteX3" y="connsiteY3"/>
+              </a:cxn>
+              <a:cxn ang="0">
+                <a:pos x="connsiteX4" y="connsiteY4"/>
+              </a:cxn>
+              <a:cxn ang="0">
+                <a:pos x="connsiteX5" y="connsiteY5"/>
+              </a:cxn>
+              <a:cxn ang="0">
+                <a:pos x="connsiteX6" y="connsiteY6"/>
+              </a:cxn>
+              <a:cxn ang="0">
+                <a:pos x="connsiteX7" y="connsiteY7"/>
+              </a:cxn>
+              <a:cxn ang="0">
+                <a:pos x="connsiteX8" y="connsiteY8"/>
+              </a:cxn>
+              <a:cxn ang="0">
+                <a:pos x="connsiteX9" y="connsiteY9"/>
+              </a:cxn>
+              <a:cxn ang="0">
+                <a:pos x="connsiteX10" y="connsiteY10"/>
+              </a:cxn>
+            </a:cxnLst>
+            <a:rect l="l" t="t" r="r" b="b"/>
+            <a:pathLst>
+              <a:path w="5464879" h="6276841">
+                <a:moveTo>
+                  <a:pt x="3299930" y="0"/>
+                </a:moveTo>
+                <a:cubicBezTo>
+                  <a:pt x="4097274" y="0"/>
+                  <a:pt x="4828569" y="282789"/>
+                  <a:pt x="5398992" y="753544"/>
+                </a:cubicBezTo>
+                <a:lnTo>
+                  <a:pt x="5464879" y="813426"/>
+                </a:lnTo>
+                <a:lnTo>
+                  <a:pt x="5464879" y="5786434"/>
+                </a:lnTo>
+                <a:lnTo>
+                  <a:pt x="5398992" y="5846317"/>
+                </a:lnTo>
+                <a:cubicBezTo>
+                  <a:pt x="5236014" y="5980818"/>
+                  <a:pt x="5059904" y="6099975"/>
+                  <a:pt x="4872873" y="6201577"/>
+                </a:cubicBezTo>
+                <a:lnTo>
+                  <a:pt x="4716632" y="6276841"/>
+                </a:lnTo>
+                <a:lnTo>
+                  <a:pt x="1883227" y="6276841"/>
+                </a:lnTo>
+                <a:lnTo>
+                  <a:pt x="1726987" y="6201577"/>
+                </a:lnTo>
+                <a:cubicBezTo>
+                  <a:pt x="698316" y="5642769"/>
+                  <a:pt x="0" y="4552900"/>
+                  <a:pt x="0" y="3299930"/>
+                </a:cubicBezTo>
+                <a:cubicBezTo>
+                  <a:pt x="0" y="1477429"/>
+                  <a:pt x="1477429" y="0"/>
+                  <a:pt x="3299930" y="0"/>
+                </a:cubicBezTo>
+                <a:close/>
+              </a:path>
+            </a:pathLst>
+          </a:custGeom>
+          <a:solidFill>
+            <a:srgbClr val="FFFFFF"/>
+          </a:solidFill>
+          <a:ln>
+            <a:gradFill>
+              <a:gsLst>
+                <a:gs pos="0">
+                  <a:schemeClr val="accent1">
+                    <a:lumMod val="40000"/>
+                    <a:lumOff val="60000"/>
+                  </a:schemeClr>
+                </a:gs>
+                <a:gs pos="23000">
+                  <a:schemeClr val="accent1">
+                    <a:lumMod val="45000"/>
+                    <a:lumOff val="55000"/>
+                  </a:schemeClr>
+                </a:gs>
+                <a:gs pos="83000">
+                  <a:schemeClr val="bg2">
+                    <a:lumMod val="75000"/>
+                  </a:schemeClr>
+                </a:gs>
+                <a:gs pos="100000">
+                  <a:schemeClr val="bg2">
+                    <a:lumMod val="75000"/>
+                  </a:schemeClr>
+                </a:gs>
+              </a:gsLst>
+              <a:lin ang="5400000" scaled="1"/>
+            </a:gradFill>
+          </a:ln>
+        </p:spPr>
+        <p:style>
+          <a:lnRef idx="2">
+            <a:schemeClr val="accent1">
+              <a:shade val="50000"/>
+            </a:schemeClr>
+          </a:lnRef>
+          <a:fillRef idx="1">
+            <a:schemeClr val="accent1"/>
+          </a:fillRef>
+          <a:effectRef idx="0">
+            <a:schemeClr val="accent1"/>
+          </a:effectRef>
+          <a:fontRef idx="minor">
+            <a:schemeClr val="lt1"/>
+          </a:fontRef>
+        </p:style>
+        <p:txBody>
+          <a:bodyPr wrap="square" rtlCol="0" anchor="ctr">
+            <a:noAutofit/>
+          </a:bodyPr>
+          <a:lstStyle/>
+          <a:p>
+            <a:pPr algn="ctr"/>
+            <a:endParaRPr lang="en-US"/>
+          </a:p>
+        </p:txBody>
+      </p:sp>
+      <p:pic>
+        <p:nvPicPr>
+          <p:cNvPr id="4" name="Picture 4">
+            <a:extLst>
+              <a:ext uri="{FF2B5EF4-FFF2-40B4-BE49-F238E27FC236}">
+                <a16:creationId xmlns:a16="http://schemas.microsoft.com/office/drawing/2014/main" id="{3C14A334-A609-4515-AB73-A6A0C8C0DC43}"/>
+              </a:ext>
+            </a:extLst>
+          </p:cNvPr>
+          <p:cNvPicPr>
+            <a:picLocks noChangeAspect="1"/>
+          </p:cNvPicPr>
+          <p:nvPr/>
+        </p:nvPicPr>
+        <p:blipFill>
+          <a:blip r:embed="rId3"/>
+          <a:stretch>
+            <a:fillRect/>
+          </a:stretch>
+        </p:blipFill>
+        <p:spPr>
+          <a:xfrm>
+            <a:off x="8653355" y="1697277"/>
+            <a:ext cx="2254590" cy="4377846"/>
+          </a:xfrm>
+          <a:prstGeom prst="rect">
+            <a:avLst/>
+          </a:prstGeom>
+        </p:spPr>
+      </p:pic>
+      <p:sp>
+        <p:nvSpPr>
+          <p:cNvPr id="8" name="Rectangle: Rounded Corners 7">
+            <a:extLst>
+              <a:ext uri="{FF2B5EF4-FFF2-40B4-BE49-F238E27FC236}">
+                <a16:creationId xmlns:a16="http://schemas.microsoft.com/office/drawing/2014/main" id="{C9B57D47-C85B-432B-B5BA-4C9B8564D0CF}"/>
+              </a:ext>
+            </a:extLst>
+          </p:cNvPr>
+          <p:cNvSpPr/>
+          <p:nvPr/>
+        </p:nvSpPr>
+        <p:spPr>
+          <a:xfrm>
+            <a:off x="645634" y="2550634"/>
+            <a:ext cx="3837541" cy="826265"/>
+          </a:xfrm>
+          <a:prstGeom prst="roundRect">
+            <a:avLst/>
+          </a:prstGeom>
+        </p:spPr>
+        <p:style>
+          <a:lnRef idx="2">
+            <a:schemeClr val="accent1">
+              <a:shade val="50000"/>
+            </a:schemeClr>
+          </a:lnRef>
+          <a:fillRef idx="1">
+            <a:schemeClr val="accent1"/>
+          </a:fillRef>
+          <a:effectRef idx="0">
+            <a:schemeClr val="accent1"/>
+          </a:effectRef>
+          <a:fontRef idx="minor">
+            <a:schemeClr val="lt1"/>
+          </a:fontRef>
+        </p:style>
+        <p:txBody>
+          <a:bodyPr rtlCol="0" anchor="ctr"/>
+          <a:lstStyle/>
+          <a:p>
+            <a:pPr algn="ctr"/>
+            <a:endParaRPr lang="en-US"/>
+          </a:p>
+        </p:txBody>
+      </p:sp>
+      <p:sp>
+        <p:nvSpPr>
+          <p:cNvPr id="10" name="TextBox 9">
+            <a:extLst>
+              <a:ext uri="{FF2B5EF4-FFF2-40B4-BE49-F238E27FC236}">
+                <a16:creationId xmlns:a16="http://schemas.microsoft.com/office/drawing/2014/main" id="{1721831E-8CD4-42B4-877A-6DC7F4F49BC4}"/>
+              </a:ext>
+            </a:extLst>
+          </p:cNvPr>
+          <p:cNvSpPr txBox="1"/>
+          <p:nvPr/>
+        </p:nvSpPr>
+        <p:spPr>
+          <a:xfrm>
+            <a:off x="879973" y="2752838"/>
+            <a:ext cx="3367488" cy="461665"/>
+          </a:xfrm>
+          <a:prstGeom prst="rect">
+            <a:avLst/>
+          </a:prstGeom>
+          <a:noFill/>
+        </p:spPr>
+        <p:txBody>
+          <a:bodyPr rot="0" spcFirstLastPara="0" vertOverflow="overflow" horzOverflow="overflow" vert="horz" wrap="square" lIns="91440" tIns="45720" rIns="91440" bIns="45720" numCol="1" spcCol="0" rtlCol="0" fromWordArt="0" anchor="t" anchorCtr="0" forceAA="0" compatLnSpc="1">
+            <a:prstTxWarp prst="textNoShape">
+              <a:avLst/>
+            </a:prstTxWarp>
+            <a:spAutoFit/>
+          </a:bodyPr>
+          <a:lstStyle/>
+          <a:p>
+            <a:r>
+              <a:rPr lang="ko-KR" altLang="en-US" sz="1200" dirty="0">
+                <a:solidFill>
+                  <a:schemeClr val="bg1"/>
+                </a:solidFill>
+                <a:ea typeface="맑은 고딕"/>
+                <a:cs typeface="Calibri"/>
+              </a:rPr>
+              <a:t>이 버튼을 누르면 </a:t>
+            </a:r>
+            <a:r>
+              <a:rPr lang="ko-KR" altLang="en-US" sz="1200" dirty="0" err="1">
+                <a:solidFill>
+                  <a:schemeClr val="bg1"/>
+                </a:solidFill>
+                <a:ea typeface="맑은 고딕"/>
+                <a:cs typeface="Calibri"/>
+              </a:rPr>
+              <a:t>Profile</a:t>
+            </a:r>
+            <a:r>
+              <a:rPr lang="ko-KR" altLang="en-US" sz="1200" dirty="0">
+                <a:solidFill>
+                  <a:schemeClr val="bg1"/>
+                </a:solidFill>
+                <a:ea typeface="맑은 고딕"/>
+                <a:cs typeface="Calibri"/>
+              </a:rPr>
+              <a:t> </a:t>
+            </a:r>
+            <a:r>
+              <a:rPr lang="ko-KR" altLang="en-US" sz="1200" dirty="0" err="1">
+                <a:solidFill>
+                  <a:schemeClr val="bg1"/>
+                </a:solidFill>
+                <a:ea typeface="맑은 고딕"/>
+                <a:cs typeface="Calibri"/>
+              </a:rPr>
+              <a:t>Screen으로</a:t>
+            </a:r>
+            <a:r>
+              <a:rPr lang="ko-KR" altLang="en-US" sz="1200" dirty="0">
+                <a:solidFill>
+                  <a:schemeClr val="bg1"/>
+                </a:solidFill>
+                <a:ea typeface="맑은 고딕"/>
+                <a:cs typeface="Calibri"/>
+              </a:rPr>
+              <a:t> 돌아갈 수 있게 </a:t>
+            </a:r>
+            <a:r>
+              <a:rPr lang="ko-KR" altLang="en-US" sz="1200" dirty="0" err="1">
+                <a:solidFill>
+                  <a:schemeClr val="bg1"/>
+                </a:solidFill>
+                <a:ea typeface="맑은 고딕"/>
+                <a:cs typeface="Calibri"/>
+              </a:rPr>
+              <a:t>navigation이</a:t>
+            </a:r>
+            <a:r>
+              <a:rPr lang="ko-KR" altLang="en-US" sz="1200" dirty="0">
+                <a:solidFill>
+                  <a:schemeClr val="bg1"/>
+                </a:solidFill>
+                <a:ea typeface="맑은 고딕"/>
+                <a:cs typeface="Calibri"/>
+              </a:rPr>
+              <a:t> 작동</a:t>
+            </a:r>
+          </a:p>
+        </p:txBody>
+      </p:sp>
+      <p:cxnSp>
+        <p:nvCxnSpPr>
+          <p:cNvPr id="11" name="Straight Arrow Connector 10">
+            <a:extLst>
+              <a:ext uri="{FF2B5EF4-FFF2-40B4-BE49-F238E27FC236}">
+                <a16:creationId xmlns:a16="http://schemas.microsoft.com/office/drawing/2014/main" id="{1C73185C-2227-4244-B415-784C50387178}"/>
+              </a:ext>
+            </a:extLst>
+          </p:cNvPr>
+          <p:cNvCxnSpPr/>
+          <p:nvPr/>
+        </p:nvCxnSpPr>
+        <p:spPr>
+          <a:xfrm flipH="1">
+            <a:off x="4467455" y="2290704"/>
+            <a:ext cx="4392056" cy="648158"/>
+          </a:xfrm>
+          <a:prstGeom prst="straightConnector1">
+            <a:avLst/>
+          </a:prstGeom>
+          <a:ln>
+            <a:tailEnd type="triangle"/>
+          </a:ln>
+        </p:spPr>
+        <p:style>
+          <a:lnRef idx="1">
+            <a:schemeClr val="accent1"/>
+          </a:lnRef>
+          <a:fillRef idx="0">
+            <a:schemeClr val="accent1"/>
+          </a:fillRef>
+          <a:effectRef idx="0">
+            <a:schemeClr val="accent1"/>
+          </a:effectRef>
+          <a:fontRef idx="minor">
+            <a:schemeClr val="tx1"/>
+          </a:fontRef>
+        </p:style>
+      </p:cxnSp>
+    </p:spTree>
+    <p:extLst>
+      <p:ext uri="{BB962C8B-B14F-4D97-AF65-F5344CB8AC3E}">
+        <p14:creationId xmlns:p14="http://schemas.microsoft.com/office/powerpoint/2010/main" val="2708098219"/>
+      </p:ext>
+    </p:extLst>
+  </p:cSld>
+  <p:clrMapOvr>
+    <a:masterClrMapping/>
+  </p:clrMapOvr>
+</p:sld>
+</file>
+
+<file path=ppt/slides/slide6.xml><?xml version="1.0" encoding="utf-8"?>
+<p:sld xmlns:a="http://schemas.openxmlformats.org/drawingml/2006/main" xmlns:r="http://schemas.openxmlformats.org/officeDocument/2006/relationships" xmlns:p="http://schemas.openxmlformats.org/presentationml/2006/main">
+  <p:cSld>
+    <p:bg>
+      <p:bgPr>
+        <a:solidFill>
+          <a:schemeClr val="bg1"/>
+        </a:solidFill>
+        <a:effectLst/>
+      </p:bgPr>
+    </p:bg>
+    <p:spTree>
+      <p:nvGrpSpPr>
+        <p:cNvPr id="1" name=""/>
+        <p:cNvGrpSpPr/>
+        <p:nvPr/>
+      </p:nvGrpSpPr>
+      <p:grpSpPr>
+        <a:xfrm>
+          <a:off x="0" y="0"/>
+          <a:ext cx="0" cy="0"/>
+          <a:chOff x="0" y="0"/>
+          <a:chExt cx="0" cy="0"/>
+        </a:xfrm>
+      </p:grpSpPr>
+      <p:sp>
+        <p:nvSpPr>
+          <p:cNvPr id="26" name="Rectangle 25">
+            <a:extLst>
+              <a:ext uri="{FF2B5EF4-FFF2-40B4-BE49-F238E27FC236}">
+                <a16:creationId xmlns:a16="http://schemas.microsoft.com/office/drawing/2014/main" id="{35555856-9970-4BC3-9AA9-6A917F53AFBD}"/>
+              </a:ext>
+              <a:ext uri="{C183D7F6-B498-43B3-948B-1728B52AA6E4}">
+                <adec:decorative xmlns:adec="http://schemas.microsoft.com/office/drawing/2017/decorative" val="1"/>
+              </a:ext>
+            </a:extLst>
+          </p:cNvPr>
+          <p:cNvSpPr>
+            <a:spLocks noGrp="1" noRot="1" noChangeAspect="1" noMove="1" noResize="1" noEditPoints="1" noAdjustHandles="1" noChangeArrowheads="1" noChangeShapeType="1" noTextEdit="1"/>
+          </p:cNvSpPr>
+          <p:nvPr>
+            <p:extLst>
+              <p:ext uri="{386F3935-93C4-4BCD-93E2-E3B085C9AB24}">
+                <p16:designElem xmlns:p16="http://schemas.microsoft.com/office/powerpoint/2015/main" val="1"/>
+              </p:ext>
+            </p:extLst>
+          </p:nvPr>
+        </p:nvSpPr>
+        <p:spPr>
+          <a:xfrm>
+            <a:off x="5769972" y="0"/>
+            <a:ext cx="6421721" cy="6858000"/>
+          </a:xfrm>
+          <a:prstGeom prst="rect">
+            <a:avLst/>
+          </a:prstGeom>
+          <a:gradFill>
+            <a:gsLst>
+              <a:gs pos="0">
+                <a:schemeClr val="accent1">
+                  <a:lumMod val="100000"/>
+                  <a:alpha val="82000"/>
+                </a:schemeClr>
+              </a:gs>
+              <a:gs pos="25000">
+                <a:schemeClr val="accent1">
+                  <a:alpha val="60000"/>
+                </a:schemeClr>
+              </a:gs>
+              <a:gs pos="94000">
+                <a:schemeClr val="bg2">
+                  <a:lumMod val="75000"/>
+                </a:schemeClr>
+              </a:gs>
+              <a:gs pos="100000">
+                <a:schemeClr val="bg2">
+                  <a:lumMod val="75000"/>
+                </a:schemeClr>
+              </a:gs>
+            </a:gsLst>
+            <a:lin ang="4200000" scaled="0"/>
+          </a:gradFill>
+          <a:ln>
+            <a:noFill/>
+          </a:ln>
+        </p:spPr>
+        <p:style>
+          <a:lnRef idx="2">
+            <a:schemeClr val="accent1">
+              <a:shade val="50000"/>
+            </a:schemeClr>
+          </a:lnRef>
+          <a:fillRef idx="1">
+            <a:schemeClr val="accent1"/>
+          </a:fillRef>
+          <a:effectRef idx="0">
+            <a:schemeClr val="accent1"/>
+          </a:effectRef>
+          <a:fontRef idx="minor">
+            <a:schemeClr val="lt1"/>
+          </a:fontRef>
+        </p:style>
+        <p:txBody>
+          <a:bodyPr rtlCol="0" anchor="ctr"/>
+          <a:lstStyle/>
+          <a:p>
+            <a:pPr algn="ctr"/>
+            <a:endParaRPr lang="en-US"/>
+          </a:p>
+        </p:txBody>
+      </p:sp>
+      <p:pic>
+        <p:nvPicPr>
+          <p:cNvPr id="28" name="Picture 27">
+            <a:extLst>
+              <a:ext uri="{FF2B5EF4-FFF2-40B4-BE49-F238E27FC236}">
+                <a16:creationId xmlns:a16="http://schemas.microsoft.com/office/drawing/2014/main" id="{7F487851-BFAF-46D8-A1ED-50CAD6E46F59}"/>
+              </a:ext>
+              <a:ext uri="{C183D7F6-B498-43B3-948B-1728B52AA6E4}">
+                <adec:decorative xmlns:adec="http://schemas.microsoft.com/office/drawing/2017/decorative" val="1"/>
+              </a:ext>
+            </a:extLst>
+          </p:cNvPr>
+          <p:cNvPicPr>
+            <a:picLocks noGrp="1" noRot="1" noChangeAspect="1" noMove="1" noResize="1" noEditPoints="1" noAdjustHandles="1" noChangeArrowheads="1" noChangeShapeType="1" noCrop="1"/>
+          </p:cNvPicPr>
+          <p:nvPr>
+            <p:extLst>
+              <p:ext uri="{386F3935-93C4-4BCD-93E2-E3B085C9AB24}">
+                <p16:designElem xmlns:p16="http://schemas.microsoft.com/office/powerpoint/2015/main" val="1"/>
+              </p:ext>
+            </p:extLst>
+          </p:nvPr>
+        </p:nvPicPr>
+        <p:blipFill>
+          <a:blip r:embed="rId2">
+            <a:extLst>
+              <a:ext uri="{28A0092B-C50C-407E-A947-70E740481C1C}">
+                <a14:useLocalDpi xmlns:a14="http://schemas.microsoft.com/office/drawing/2010/main" val="0"/>
+              </a:ext>
+            </a:extLst>
+          </a:blip>
+          <a:stretch>
+            <a:fillRect/>
+          </a:stretch>
+        </p:blipFill>
+        <p:spPr>
+          <a:xfrm flipH="1">
+            <a:off x="0" y="0"/>
+            <a:ext cx="12192000" cy="6858000"/>
+          </a:xfrm>
+          <a:prstGeom prst="rect">
+            <a:avLst/>
+          </a:prstGeom>
+        </p:spPr>
+      </p:pic>
+      <p:sp>
+        <p:nvSpPr>
+          <p:cNvPr id="2" name="Title 1">
+            <a:extLst>
+              <a:ext uri="{FF2B5EF4-FFF2-40B4-BE49-F238E27FC236}">
+                <a16:creationId xmlns:a16="http://schemas.microsoft.com/office/drawing/2014/main" id="{FD142945-A795-4FB6-8E66-AAB2150E20F8}"/>
+              </a:ext>
+            </a:extLst>
+          </p:cNvPr>
+          <p:cNvSpPr>
+            <a:spLocks noGrp="1"/>
+          </p:cNvSpPr>
+          <p:nvPr>
+            <p:ph type="title"/>
+          </p:nvPr>
+        </p:nvSpPr>
+        <p:spPr>
+          <a:xfrm>
+            <a:off x="804484" y="4267832"/>
+            <a:ext cx="4805996" cy="1297115"/>
+          </a:xfrm>
+        </p:spPr>
+        <p:txBody>
+          <a:bodyPr vert="horz" lIns="91440" tIns="45720" rIns="91440" bIns="45720" rtlCol="0" anchor="t">
+            <a:normAutofit/>
+          </a:bodyPr>
+          <a:lstStyle/>
+          <a:p>
+            <a:r>
+              <a:rPr lang="en-US" sz="4100" kern="1200">
+                <a:solidFill>
+                  <a:srgbClr val="000000"/>
+                </a:solidFill>
+                <a:latin typeface="+mj-lt"/>
+                <a:ea typeface="+mj-ea"/>
+                <a:cs typeface="+mj-cs"/>
+              </a:rPr>
+              <a:t>Humidity Graph</a:t>
+            </a:r>
+            <a:r>
+              <a:rPr lang="en-US" sz="4100" kern="1200" dirty="0">
+                <a:solidFill>
+                  <a:srgbClr val="000000"/>
+                </a:solidFill>
+                <a:latin typeface="+mj-lt"/>
+                <a:ea typeface="+mj-ea"/>
+                <a:cs typeface="+mj-cs"/>
+              </a:rPr>
+              <a:t> Screen</a:t>
+            </a:r>
+          </a:p>
+        </p:txBody>
+      </p:sp>
+      <p:sp>
+        <p:nvSpPr>
+          <p:cNvPr id="30" name="Freeform 50">
+            <a:extLst>
+              <a:ext uri="{FF2B5EF4-FFF2-40B4-BE49-F238E27FC236}">
+                <a16:creationId xmlns:a16="http://schemas.microsoft.com/office/drawing/2014/main" id="{13722DD7-BA73-4776-93A3-94491FEF7260}"/>
+              </a:ext>
+              <a:ext uri="{C183D7F6-B498-43B3-948B-1728B52AA6E4}">
+                <adec:decorative xmlns:adec="http://schemas.microsoft.com/office/drawing/2017/decorative" val="1"/>
+              </a:ext>
+            </a:extLst>
+          </p:cNvPr>
+          <p:cNvSpPr>
+            <a:spLocks noGrp="1" noRot="1" noChangeAspect="1" noMove="1" noResize="1" noEditPoints="1" noAdjustHandles="1" noChangeArrowheads="1" noChangeShapeType="1" noTextEdit="1"/>
+          </p:cNvSpPr>
+          <p:nvPr>
+            <p:extLst>
+              <p:ext uri="{386F3935-93C4-4BCD-93E2-E3B085C9AB24}">
+                <p16:designElem xmlns:p16="http://schemas.microsoft.com/office/powerpoint/2015/main" val="1"/>
+              </p:ext>
+            </p:extLst>
+          </p:nvPr>
+        </p:nvSpPr>
+        <p:spPr>
+          <a:xfrm>
+            <a:off x="6727121" y="581159"/>
+            <a:ext cx="5464879" cy="6276841"/>
+          </a:xfrm>
+          <a:custGeom>
+            <a:avLst/>
+            <a:gdLst>
+              <a:gd name="connsiteX0" fmla="*/ 3299930 w 5464879"/>
+              <a:gd name="connsiteY0" fmla="*/ 0 h 6276841"/>
+              <a:gd name="connsiteX1" fmla="*/ 5398992 w 5464879"/>
+              <a:gd name="connsiteY1" fmla="*/ 753544 h 6276841"/>
+              <a:gd name="connsiteX2" fmla="*/ 5464879 w 5464879"/>
+              <a:gd name="connsiteY2" fmla="*/ 813426 h 6276841"/>
+              <a:gd name="connsiteX3" fmla="*/ 5464879 w 5464879"/>
+              <a:gd name="connsiteY3" fmla="*/ 5786434 h 6276841"/>
+              <a:gd name="connsiteX4" fmla="*/ 5398992 w 5464879"/>
+              <a:gd name="connsiteY4" fmla="*/ 5846317 h 6276841"/>
+              <a:gd name="connsiteX5" fmla="*/ 4872873 w 5464879"/>
+              <a:gd name="connsiteY5" fmla="*/ 6201577 h 6276841"/>
+              <a:gd name="connsiteX6" fmla="*/ 4716632 w 5464879"/>
+              <a:gd name="connsiteY6" fmla="*/ 6276841 h 6276841"/>
+              <a:gd name="connsiteX7" fmla="*/ 1883227 w 5464879"/>
+              <a:gd name="connsiteY7" fmla="*/ 6276841 h 6276841"/>
+              <a:gd name="connsiteX8" fmla="*/ 1726987 w 5464879"/>
+              <a:gd name="connsiteY8" fmla="*/ 6201577 h 6276841"/>
+              <a:gd name="connsiteX9" fmla="*/ 0 w 5464879"/>
+              <a:gd name="connsiteY9" fmla="*/ 3299930 h 6276841"/>
+              <a:gd name="connsiteX10" fmla="*/ 3299930 w 5464879"/>
+              <a:gd name="connsiteY10" fmla="*/ 0 h 6276841"/>
+            </a:gdLst>
+            <a:ahLst/>
+            <a:cxnLst>
+              <a:cxn ang="0">
+                <a:pos x="connsiteX0" y="connsiteY0"/>
+              </a:cxn>
+              <a:cxn ang="0">
+                <a:pos x="connsiteX1" y="connsiteY1"/>
+              </a:cxn>
+              <a:cxn ang="0">
+                <a:pos x="connsiteX2" y="connsiteY2"/>
+              </a:cxn>
+              <a:cxn ang="0">
+                <a:pos x="connsiteX3" y="connsiteY3"/>
+              </a:cxn>
+              <a:cxn ang="0">
+                <a:pos x="connsiteX4" y="connsiteY4"/>
+              </a:cxn>
+              <a:cxn ang="0">
+                <a:pos x="connsiteX5" y="connsiteY5"/>
+              </a:cxn>
+              <a:cxn ang="0">
+                <a:pos x="connsiteX6" y="connsiteY6"/>
+              </a:cxn>
+              <a:cxn ang="0">
+                <a:pos x="connsiteX7" y="connsiteY7"/>
+              </a:cxn>
+              <a:cxn ang="0">
+                <a:pos x="connsiteX8" y="connsiteY8"/>
+              </a:cxn>
+              <a:cxn ang="0">
+                <a:pos x="connsiteX9" y="connsiteY9"/>
+              </a:cxn>
+              <a:cxn ang="0">
+                <a:pos x="connsiteX10" y="connsiteY10"/>
+              </a:cxn>
+            </a:cxnLst>
+            <a:rect l="l" t="t" r="r" b="b"/>
+            <a:pathLst>
+              <a:path w="5464879" h="6276841">
+                <a:moveTo>
+                  <a:pt x="3299930" y="0"/>
+                </a:moveTo>
+                <a:cubicBezTo>
+                  <a:pt x="4097274" y="0"/>
+                  <a:pt x="4828569" y="282789"/>
+                  <a:pt x="5398992" y="753544"/>
+                </a:cubicBezTo>
+                <a:lnTo>
+                  <a:pt x="5464879" y="813426"/>
+                </a:lnTo>
+                <a:lnTo>
+                  <a:pt x="5464879" y="5786434"/>
+                </a:lnTo>
+                <a:lnTo>
+                  <a:pt x="5398992" y="5846317"/>
+                </a:lnTo>
+                <a:cubicBezTo>
+                  <a:pt x="5236014" y="5980818"/>
+                  <a:pt x="5059904" y="6099975"/>
+                  <a:pt x="4872873" y="6201577"/>
+                </a:cubicBezTo>
+                <a:lnTo>
+                  <a:pt x="4716632" y="6276841"/>
+                </a:lnTo>
+                <a:lnTo>
+                  <a:pt x="1883227" y="6276841"/>
+                </a:lnTo>
+                <a:lnTo>
+                  <a:pt x="1726987" y="6201577"/>
+                </a:lnTo>
+                <a:cubicBezTo>
+                  <a:pt x="698316" y="5642769"/>
+                  <a:pt x="0" y="4552900"/>
+                  <a:pt x="0" y="3299930"/>
+                </a:cubicBezTo>
+                <a:cubicBezTo>
+                  <a:pt x="0" y="1477429"/>
+                  <a:pt x="1477429" y="0"/>
+                  <a:pt x="3299930" y="0"/>
+                </a:cubicBezTo>
+                <a:close/>
+              </a:path>
+            </a:pathLst>
+          </a:custGeom>
+          <a:solidFill>
+            <a:srgbClr val="FFFFFF"/>
+          </a:solidFill>
+          <a:ln>
+            <a:gradFill>
+              <a:gsLst>
+                <a:gs pos="0">
+                  <a:schemeClr val="accent1">
+                    <a:lumMod val="40000"/>
+                    <a:lumOff val="60000"/>
+                  </a:schemeClr>
+                </a:gs>
+                <a:gs pos="23000">
+                  <a:schemeClr val="accent1">
+                    <a:lumMod val="45000"/>
+                    <a:lumOff val="55000"/>
+                  </a:schemeClr>
+                </a:gs>
+                <a:gs pos="83000">
+                  <a:schemeClr val="bg2">
+                    <a:lumMod val="75000"/>
+                  </a:schemeClr>
+                </a:gs>
+                <a:gs pos="100000">
+                  <a:schemeClr val="bg2">
+                    <a:lumMod val="75000"/>
+                  </a:schemeClr>
+                </a:gs>
+              </a:gsLst>
+              <a:lin ang="5400000" scaled="1"/>
+            </a:gradFill>
+          </a:ln>
+        </p:spPr>
+        <p:style>
+          <a:lnRef idx="2">
+            <a:schemeClr val="accent1">
+              <a:shade val="50000"/>
+            </a:schemeClr>
+          </a:lnRef>
+          <a:fillRef idx="1">
+            <a:schemeClr val="accent1"/>
+          </a:fillRef>
+          <a:effectRef idx="0">
+            <a:schemeClr val="accent1"/>
+          </a:effectRef>
+          <a:fontRef idx="minor">
+            <a:schemeClr val="lt1"/>
+          </a:fontRef>
+        </p:style>
+        <p:txBody>
+          <a:bodyPr wrap="square" rtlCol="0" anchor="ctr">
+            <a:noAutofit/>
+          </a:bodyPr>
+          <a:lstStyle/>
+          <a:p>
+            <a:pPr algn="ctr"/>
+            <a:endParaRPr lang="en-US"/>
+          </a:p>
+        </p:txBody>
+      </p:sp>
+      <p:pic>
+        <p:nvPicPr>
+          <p:cNvPr id="3" name="Picture 4">
+            <a:extLst>
+              <a:ext uri="{FF2B5EF4-FFF2-40B4-BE49-F238E27FC236}">
+                <a16:creationId xmlns:a16="http://schemas.microsoft.com/office/drawing/2014/main" id="{7038A0D9-D315-4E51-9220-8FB0C76C1012}"/>
+              </a:ext>
+            </a:extLst>
+          </p:cNvPr>
+          <p:cNvPicPr>
+            <a:picLocks noChangeAspect="1"/>
+          </p:cNvPicPr>
+          <p:nvPr/>
+        </p:nvPicPr>
+        <p:blipFill>
+          <a:blip r:embed="rId3"/>
+          <a:stretch>
+            <a:fillRect/>
+          </a:stretch>
+        </p:blipFill>
+        <p:spPr>
+          <a:xfrm>
+            <a:off x="8653355" y="1697277"/>
+            <a:ext cx="2254590" cy="4377846"/>
+          </a:xfrm>
+          <a:prstGeom prst="rect">
+            <a:avLst/>
+          </a:prstGeom>
+        </p:spPr>
+      </p:pic>
+    </p:spTree>
+    <p:extLst>
+      <p:ext uri="{BB962C8B-B14F-4D97-AF65-F5344CB8AC3E}">
+        <p14:creationId xmlns:p14="http://schemas.microsoft.com/office/powerpoint/2010/main" val="3723083926"/>
+      </p:ext>
+    </p:extLst>
+  </p:cSld>
+  <p:clrMapOvr>
+    <a:masterClrMapping/>
+  </p:clrMapOvr>
+</p:sld>
+</file>
+
+<file path=ppt/slides/slide7.xml><?xml version="1.0" encoding="utf-8"?>
+<p:sld xmlns:a="http://schemas.openxmlformats.org/drawingml/2006/main" xmlns:r="http://schemas.openxmlformats.org/officeDocument/2006/relationships" xmlns:p="http://schemas.openxmlformats.org/presentationml/2006/main">
+  <p:cSld>
+    <p:bg>
+      <p:bgPr>
+        <a:solidFill>
+          <a:schemeClr val="bg1"/>
+        </a:solidFill>
+        <a:effectLst/>
+      </p:bgPr>
+    </p:bg>
+    <p:spTree>
+      <p:nvGrpSpPr>
+        <p:cNvPr id="1" name=""/>
+        <p:cNvGrpSpPr/>
+        <p:nvPr/>
+      </p:nvGrpSpPr>
+      <p:grpSpPr>
+        <a:xfrm>
+          <a:off x="0" y="0"/>
+          <a:ext cx="0" cy="0"/>
+          <a:chOff x="0" y="0"/>
+          <a:chExt cx="0" cy="0"/>
+        </a:xfrm>
+      </p:grpSpPr>
+      <p:sp>
+        <p:nvSpPr>
+          <p:cNvPr id="26" name="Rectangle 25">
+            <a:extLst>
+              <a:ext uri="{FF2B5EF4-FFF2-40B4-BE49-F238E27FC236}">
+                <a16:creationId xmlns:a16="http://schemas.microsoft.com/office/drawing/2014/main" id="{35555856-9970-4BC3-9AA9-6A917F53AFBD}"/>
+              </a:ext>
+              <a:ext uri="{C183D7F6-B498-43B3-948B-1728B52AA6E4}">
+                <adec:decorative xmlns:adec="http://schemas.microsoft.com/office/drawing/2017/decorative" val="1"/>
+              </a:ext>
+            </a:extLst>
+          </p:cNvPr>
+          <p:cNvSpPr>
+            <a:spLocks noGrp="1" noRot="1" noChangeAspect="1" noMove="1" noResize="1" noEditPoints="1" noAdjustHandles="1" noChangeArrowheads="1" noChangeShapeType="1" noTextEdit="1"/>
+          </p:cNvSpPr>
+          <p:nvPr>
+            <p:extLst>
+              <p:ext uri="{386F3935-93C4-4BCD-93E2-E3B085C9AB24}">
+                <p16:designElem xmlns:p16="http://schemas.microsoft.com/office/powerpoint/2015/main" val="1"/>
+              </p:ext>
+            </p:extLst>
+          </p:nvPr>
+        </p:nvSpPr>
+        <p:spPr>
+          <a:xfrm>
+            <a:off x="5769972" y="0"/>
+            <a:ext cx="6421721" cy="6858000"/>
+          </a:xfrm>
+          <a:prstGeom prst="rect">
+            <a:avLst/>
+          </a:prstGeom>
+          <a:gradFill>
+            <a:gsLst>
+              <a:gs pos="0">
+                <a:schemeClr val="accent1">
+                  <a:lumMod val="100000"/>
+                  <a:alpha val="82000"/>
+                </a:schemeClr>
+              </a:gs>
+              <a:gs pos="25000">
+                <a:schemeClr val="accent1">
+                  <a:alpha val="60000"/>
+                </a:schemeClr>
+              </a:gs>
+              <a:gs pos="94000">
+                <a:schemeClr val="bg2">
+                  <a:lumMod val="75000"/>
+                </a:schemeClr>
+              </a:gs>
+              <a:gs pos="100000">
+                <a:schemeClr val="bg2">
+                  <a:lumMod val="75000"/>
+                </a:schemeClr>
+              </a:gs>
+            </a:gsLst>
+            <a:lin ang="4200000" scaled="0"/>
+          </a:gradFill>
+          <a:ln>
+            <a:noFill/>
+          </a:ln>
+        </p:spPr>
+        <p:style>
+          <a:lnRef idx="2">
+            <a:schemeClr val="accent1">
+              <a:shade val="50000"/>
+            </a:schemeClr>
+          </a:lnRef>
+          <a:fillRef idx="1">
+            <a:schemeClr val="accent1"/>
+          </a:fillRef>
+          <a:effectRef idx="0">
+            <a:schemeClr val="accent1"/>
+          </a:effectRef>
+          <a:fontRef idx="minor">
+            <a:schemeClr val="lt1"/>
+          </a:fontRef>
+        </p:style>
+        <p:txBody>
+          <a:bodyPr rtlCol="0" anchor="ctr"/>
+          <a:lstStyle/>
+          <a:p>
+            <a:pPr algn="ctr"/>
+            <a:endParaRPr lang="en-US"/>
+          </a:p>
+        </p:txBody>
+      </p:sp>
+      <p:pic>
+        <p:nvPicPr>
+          <p:cNvPr id="28" name="Picture 27">
+            <a:extLst>
+              <a:ext uri="{FF2B5EF4-FFF2-40B4-BE49-F238E27FC236}">
+                <a16:creationId xmlns:a16="http://schemas.microsoft.com/office/drawing/2014/main" id="{7F487851-BFAF-46D8-A1ED-50CAD6E46F59}"/>
+              </a:ext>
+              <a:ext uri="{C183D7F6-B498-43B3-948B-1728B52AA6E4}">
+                <adec:decorative xmlns:adec="http://schemas.microsoft.com/office/drawing/2017/decorative" val="1"/>
+              </a:ext>
+            </a:extLst>
+          </p:cNvPr>
+          <p:cNvPicPr>
+            <a:picLocks noGrp="1" noRot="1" noChangeAspect="1" noMove="1" noResize="1" noEditPoints="1" noAdjustHandles="1" noChangeArrowheads="1" noChangeShapeType="1" noCrop="1"/>
+          </p:cNvPicPr>
+          <p:nvPr>
+            <p:extLst>
+              <p:ext uri="{386F3935-93C4-4BCD-93E2-E3B085C9AB24}">
+                <p16:designElem xmlns:p16="http://schemas.microsoft.com/office/powerpoint/2015/main" val="1"/>
+              </p:ext>
+            </p:extLst>
+          </p:nvPr>
+        </p:nvPicPr>
+        <p:blipFill>
+          <a:blip r:embed="rId2">
+            <a:extLst>
+              <a:ext uri="{28A0092B-C50C-407E-A947-70E740481C1C}">
+                <a14:useLocalDpi xmlns:a14="http://schemas.microsoft.com/office/drawing/2010/main" val="0"/>
+              </a:ext>
+            </a:extLst>
+          </a:blip>
+          <a:stretch>
+            <a:fillRect/>
+          </a:stretch>
+        </p:blipFill>
+        <p:spPr>
+          <a:xfrm flipH="1">
+            <a:off x="0" y="0"/>
+            <a:ext cx="12192000" cy="6858000"/>
+          </a:xfrm>
+          <a:prstGeom prst="rect">
+            <a:avLst/>
+          </a:prstGeom>
+        </p:spPr>
+      </p:pic>
+      <p:sp>
+        <p:nvSpPr>
+          <p:cNvPr id="30" name="Freeform 50">
+            <a:extLst>
+              <a:ext uri="{FF2B5EF4-FFF2-40B4-BE49-F238E27FC236}">
+                <a16:creationId xmlns:a16="http://schemas.microsoft.com/office/drawing/2014/main" id="{13722DD7-BA73-4776-93A3-94491FEF7260}"/>
+              </a:ext>
+              <a:ext uri="{C183D7F6-B498-43B3-948B-1728B52AA6E4}">
+                <adec:decorative xmlns:adec="http://schemas.microsoft.com/office/drawing/2017/decorative" val="1"/>
+              </a:ext>
+            </a:extLst>
+          </p:cNvPr>
+          <p:cNvSpPr>
+            <a:spLocks noGrp="1" noRot="1" noChangeAspect="1" noMove="1" noResize="1" noEditPoints="1" noAdjustHandles="1" noChangeArrowheads="1" noChangeShapeType="1" noTextEdit="1"/>
+          </p:cNvSpPr>
+          <p:nvPr>
+            <p:extLst>
+              <p:ext uri="{386F3935-93C4-4BCD-93E2-E3B085C9AB24}">
+                <p16:designElem xmlns:p16="http://schemas.microsoft.com/office/powerpoint/2015/main" val="1"/>
+              </p:ext>
+            </p:extLst>
+          </p:nvPr>
+        </p:nvSpPr>
+        <p:spPr>
+          <a:xfrm>
+            <a:off x="6727121" y="581159"/>
+            <a:ext cx="5464879" cy="6276841"/>
+          </a:xfrm>
+          <a:custGeom>
+            <a:avLst/>
+            <a:gdLst>
+              <a:gd name="connsiteX0" fmla="*/ 3299930 w 5464879"/>
+              <a:gd name="connsiteY0" fmla="*/ 0 h 6276841"/>
+              <a:gd name="connsiteX1" fmla="*/ 5398992 w 5464879"/>
+              <a:gd name="connsiteY1" fmla="*/ 753544 h 6276841"/>
+              <a:gd name="connsiteX2" fmla="*/ 5464879 w 5464879"/>
+              <a:gd name="connsiteY2" fmla="*/ 813426 h 6276841"/>
+              <a:gd name="connsiteX3" fmla="*/ 5464879 w 5464879"/>
+              <a:gd name="connsiteY3" fmla="*/ 5786434 h 6276841"/>
+              <a:gd name="connsiteX4" fmla="*/ 5398992 w 5464879"/>
+              <a:gd name="connsiteY4" fmla="*/ 5846317 h 6276841"/>
+              <a:gd name="connsiteX5" fmla="*/ 4872873 w 5464879"/>
+              <a:gd name="connsiteY5" fmla="*/ 6201577 h 6276841"/>
+              <a:gd name="connsiteX6" fmla="*/ 4716632 w 5464879"/>
+              <a:gd name="connsiteY6" fmla="*/ 6276841 h 6276841"/>
+              <a:gd name="connsiteX7" fmla="*/ 1883227 w 5464879"/>
+              <a:gd name="connsiteY7" fmla="*/ 6276841 h 6276841"/>
+              <a:gd name="connsiteX8" fmla="*/ 1726987 w 5464879"/>
+              <a:gd name="connsiteY8" fmla="*/ 6201577 h 6276841"/>
+              <a:gd name="connsiteX9" fmla="*/ 0 w 5464879"/>
+              <a:gd name="connsiteY9" fmla="*/ 3299930 h 6276841"/>
+              <a:gd name="connsiteX10" fmla="*/ 3299930 w 5464879"/>
+              <a:gd name="connsiteY10" fmla="*/ 0 h 6276841"/>
+            </a:gdLst>
+            <a:ahLst/>
+            <a:cxnLst>
+              <a:cxn ang="0">
+                <a:pos x="connsiteX0" y="connsiteY0"/>
+              </a:cxn>
+              <a:cxn ang="0">
+                <a:pos x="connsiteX1" y="connsiteY1"/>
+              </a:cxn>
+              <a:cxn ang="0">
+                <a:pos x="connsiteX2" y="connsiteY2"/>
+              </a:cxn>
+              <a:cxn ang="0">
+                <a:pos x="connsiteX3" y="connsiteY3"/>
+              </a:cxn>
+              <a:cxn ang="0">
+                <a:pos x="connsiteX4" y="connsiteY4"/>
+              </a:cxn>
+              <a:cxn ang="0">
+                <a:pos x="connsiteX5" y="connsiteY5"/>
+              </a:cxn>
+              <a:cxn ang="0">
+                <a:pos x="connsiteX6" y="connsiteY6"/>
+              </a:cxn>
+              <a:cxn ang="0">
+                <a:pos x="connsiteX7" y="connsiteY7"/>
+              </a:cxn>
+              <a:cxn ang="0">
+                <a:pos x="connsiteX8" y="connsiteY8"/>
+              </a:cxn>
+              <a:cxn ang="0">
+                <a:pos x="connsiteX9" y="connsiteY9"/>
+              </a:cxn>
+              <a:cxn ang="0">
+                <a:pos x="connsiteX10" y="connsiteY10"/>
+              </a:cxn>
+            </a:cxnLst>
+            <a:rect l="l" t="t" r="r" b="b"/>
+            <a:pathLst>
+              <a:path w="5464879" h="6276841">
+                <a:moveTo>
+                  <a:pt x="3299930" y="0"/>
+                </a:moveTo>
+                <a:cubicBezTo>
+                  <a:pt x="4097274" y="0"/>
+                  <a:pt x="4828569" y="282789"/>
+                  <a:pt x="5398992" y="753544"/>
+                </a:cubicBezTo>
+                <a:lnTo>
+                  <a:pt x="5464879" y="813426"/>
+                </a:lnTo>
+                <a:lnTo>
+                  <a:pt x="5464879" y="5786434"/>
+                </a:lnTo>
+                <a:lnTo>
+                  <a:pt x="5398992" y="5846317"/>
+                </a:lnTo>
+                <a:cubicBezTo>
+                  <a:pt x="5236014" y="5980818"/>
+                  <a:pt x="5059904" y="6099975"/>
+                  <a:pt x="4872873" y="6201577"/>
+                </a:cubicBezTo>
+                <a:lnTo>
+                  <a:pt x="4716632" y="6276841"/>
+                </a:lnTo>
+                <a:lnTo>
+                  <a:pt x="1883227" y="6276841"/>
+                </a:lnTo>
+                <a:lnTo>
+                  <a:pt x="1726987" y="6201577"/>
+                </a:lnTo>
+                <a:cubicBezTo>
+                  <a:pt x="698316" y="5642769"/>
+                  <a:pt x="0" y="4552900"/>
+                  <a:pt x="0" y="3299930"/>
+                </a:cubicBezTo>
+                <a:cubicBezTo>
+                  <a:pt x="0" y="1477429"/>
+                  <a:pt x="1477429" y="0"/>
+                  <a:pt x="3299930" y="0"/>
+                </a:cubicBezTo>
+                <a:close/>
+              </a:path>
+            </a:pathLst>
+          </a:custGeom>
+          <a:solidFill>
+            <a:srgbClr val="FFFFFF"/>
+          </a:solidFill>
+          <a:ln>
+            <a:gradFill>
+              <a:gsLst>
+                <a:gs pos="0">
+                  <a:schemeClr val="accent1">
+                    <a:lumMod val="40000"/>
+                    <a:lumOff val="60000"/>
+                  </a:schemeClr>
+                </a:gs>
+                <a:gs pos="23000">
+                  <a:schemeClr val="accent1">
+                    <a:lumMod val="45000"/>
+                    <a:lumOff val="55000"/>
+                  </a:schemeClr>
+                </a:gs>
+                <a:gs pos="83000">
+                  <a:schemeClr val="bg2">
+                    <a:lumMod val="75000"/>
+                  </a:schemeClr>
+                </a:gs>
+                <a:gs pos="100000">
+                  <a:schemeClr val="bg2">
+                    <a:lumMod val="75000"/>
+                  </a:schemeClr>
+                </a:gs>
+              </a:gsLst>
+              <a:lin ang="5400000" scaled="1"/>
+            </a:gradFill>
+          </a:ln>
+        </p:spPr>
+        <p:style>
+          <a:lnRef idx="2">
+            <a:schemeClr val="accent1">
+              <a:shade val="50000"/>
+            </a:schemeClr>
+          </a:lnRef>
+          <a:fillRef idx="1">
+            <a:schemeClr val="accent1"/>
+          </a:fillRef>
+          <a:effectRef idx="0">
+            <a:schemeClr val="accent1"/>
+          </a:effectRef>
+          <a:fontRef idx="minor">
+            <a:schemeClr val="lt1"/>
+          </a:fontRef>
+        </p:style>
+        <p:txBody>
+          <a:bodyPr wrap="square" rtlCol="0" anchor="ctr">
+            <a:noAutofit/>
+          </a:bodyPr>
+          <a:lstStyle/>
+          <a:p>
+            <a:pPr algn="ctr"/>
+            <a:endParaRPr lang="en-US"/>
+          </a:p>
+        </p:txBody>
+      </p:sp>
+      <p:pic>
+        <p:nvPicPr>
+          <p:cNvPr id="3" name="Picture 4">
+            <a:extLst>
+              <a:ext uri="{FF2B5EF4-FFF2-40B4-BE49-F238E27FC236}">
+                <a16:creationId xmlns:a16="http://schemas.microsoft.com/office/drawing/2014/main" id="{7038A0D9-D315-4E51-9220-8FB0C76C1012}"/>
+              </a:ext>
+            </a:extLst>
+          </p:cNvPr>
+          <p:cNvPicPr>
+            <a:picLocks noChangeAspect="1"/>
+          </p:cNvPicPr>
+          <p:nvPr/>
+        </p:nvPicPr>
+        <p:blipFill>
+          <a:blip r:embed="rId3"/>
+          <a:stretch>
+            <a:fillRect/>
+          </a:stretch>
+        </p:blipFill>
+        <p:spPr>
+          <a:xfrm>
+            <a:off x="8653355" y="1697277"/>
+            <a:ext cx="2254590" cy="4377846"/>
+          </a:xfrm>
+          <a:prstGeom prst="rect">
+            <a:avLst/>
+          </a:prstGeom>
+        </p:spPr>
+      </p:pic>
+      <p:sp>
+        <p:nvSpPr>
+          <p:cNvPr id="6" name="Rectangle: Rounded Corners 5">
+            <a:extLst>
+              <a:ext uri="{FF2B5EF4-FFF2-40B4-BE49-F238E27FC236}">
+                <a16:creationId xmlns:a16="http://schemas.microsoft.com/office/drawing/2014/main" id="{834B4F65-D231-4F56-8310-A8B357F708C1}"/>
+              </a:ext>
+            </a:extLst>
+          </p:cNvPr>
+          <p:cNvSpPr/>
+          <p:nvPr/>
+        </p:nvSpPr>
+        <p:spPr>
+          <a:xfrm>
+            <a:off x="645634" y="2550634"/>
+            <a:ext cx="3837541" cy="826265"/>
+          </a:xfrm>
+          <a:prstGeom prst="roundRect">
+            <a:avLst/>
+          </a:prstGeom>
+        </p:spPr>
+        <p:style>
+          <a:lnRef idx="2">
+            <a:schemeClr val="accent1">
+              <a:shade val="50000"/>
+            </a:schemeClr>
+          </a:lnRef>
+          <a:fillRef idx="1">
+            <a:schemeClr val="accent1"/>
+          </a:fillRef>
+          <a:effectRef idx="0">
+            <a:schemeClr val="accent1"/>
+          </a:effectRef>
+          <a:fontRef idx="minor">
+            <a:schemeClr val="lt1"/>
+          </a:fontRef>
+        </p:style>
+        <p:txBody>
+          <a:bodyPr rtlCol="0" anchor="ctr"/>
+          <a:lstStyle/>
+          <a:p>
+            <a:pPr algn="ctr"/>
+            <a:endParaRPr lang="en-US"/>
+          </a:p>
+        </p:txBody>
+      </p:sp>
+      <p:sp>
+        <p:nvSpPr>
+          <p:cNvPr id="7" name="TextBox 6">
+            <a:extLst>
+              <a:ext uri="{FF2B5EF4-FFF2-40B4-BE49-F238E27FC236}">
+                <a16:creationId xmlns:a16="http://schemas.microsoft.com/office/drawing/2014/main" id="{59DDC146-D622-4431-BDA2-D65135A1D615}"/>
+              </a:ext>
+            </a:extLst>
+          </p:cNvPr>
+          <p:cNvSpPr txBox="1"/>
+          <p:nvPr/>
+        </p:nvSpPr>
+        <p:spPr>
+          <a:xfrm>
+            <a:off x="879973" y="2752838"/>
+            <a:ext cx="3367488" cy="461665"/>
+          </a:xfrm>
+          <a:prstGeom prst="rect">
+            <a:avLst/>
+          </a:prstGeom>
+          <a:noFill/>
+        </p:spPr>
+        <p:txBody>
+          <a:bodyPr rot="0" spcFirstLastPara="0" vertOverflow="overflow" horzOverflow="overflow" vert="horz" wrap="square" lIns="91440" tIns="45720" rIns="91440" bIns="45720" numCol="1" spcCol="0" rtlCol="0" fromWordArt="0" anchor="t" anchorCtr="0" forceAA="0" compatLnSpc="1">
+            <a:prstTxWarp prst="textNoShape">
+              <a:avLst/>
+            </a:prstTxWarp>
+            <a:spAutoFit/>
+          </a:bodyPr>
+          <a:lstStyle/>
+          <a:p>
+            <a:r>
+              <a:rPr lang="ko-KR" altLang="en-US" sz="1200" dirty="0">
+                <a:solidFill>
+                  <a:schemeClr val="bg1"/>
+                </a:solidFill>
+                <a:ea typeface="맑은 고딕"/>
+                <a:cs typeface="Calibri"/>
+              </a:rPr>
+              <a:t>이 버튼을 누르면 </a:t>
+            </a:r>
+            <a:r>
+              <a:rPr lang="ko-KR" altLang="en-US" sz="1200" dirty="0" err="1">
+                <a:solidFill>
+                  <a:schemeClr val="bg1"/>
+                </a:solidFill>
+                <a:ea typeface="맑은 고딕"/>
+                <a:cs typeface="Calibri"/>
+              </a:rPr>
+              <a:t>Profile</a:t>
+            </a:r>
+            <a:r>
+              <a:rPr lang="ko-KR" altLang="en-US" sz="1200" dirty="0">
+                <a:solidFill>
+                  <a:schemeClr val="bg1"/>
+                </a:solidFill>
+                <a:ea typeface="맑은 고딕"/>
+                <a:cs typeface="Calibri"/>
+              </a:rPr>
+              <a:t> </a:t>
+            </a:r>
+            <a:r>
+              <a:rPr lang="ko-KR" altLang="en-US" sz="1200" dirty="0" err="1">
+                <a:solidFill>
+                  <a:schemeClr val="bg1"/>
+                </a:solidFill>
+                <a:ea typeface="맑은 고딕"/>
+                <a:cs typeface="Calibri"/>
+              </a:rPr>
+              <a:t>Screen으로</a:t>
+            </a:r>
+            <a:r>
+              <a:rPr lang="ko-KR" altLang="en-US" sz="1200" dirty="0">
+                <a:solidFill>
+                  <a:schemeClr val="bg1"/>
+                </a:solidFill>
+                <a:ea typeface="맑은 고딕"/>
+                <a:cs typeface="Calibri"/>
+              </a:rPr>
+              <a:t> 돌아갈 수 있게 </a:t>
+            </a:r>
+            <a:r>
+              <a:rPr lang="ko-KR" altLang="en-US" sz="1200" dirty="0" err="1">
+                <a:solidFill>
+                  <a:schemeClr val="bg1"/>
+                </a:solidFill>
+                <a:ea typeface="맑은 고딕"/>
+                <a:cs typeface="Calibri"/>
+              </a:rPr>
+              <a:t>navigation이</a:t>
+            </a:r>
+            <a:r>
+              <a:rPr lang="ko-KR" altLang="en-US" sz="1200" dirty="0">
+                <a:solidFill>
+                  <a:schemeClr val="bg1"/>
+                </a:solidFill>
+                <a:ea typeface="맑은 고딕"/>
+                <a:cs typeface="Calibri"/>
+              </a:rPr>
+              <a:t> 작동</a:t>
+            </a:r>
+          </a:p>
+        </p:txBody>
+      </p:sp>
+      <p:cxnSp>
+        <p:nvCxnSpPr>
+          <p:cNvPr id="8" name="Straight Arrow Connector 7">
+            <a:extLst>
+              <a:ext uri="{FF2B5EF4-FFF2-40B4-BE49-F238E27FC236}">
+                <a16:creationId xmlns:a16="http://schemas.microsoft.com/office/drawing/2014/main" id="{A3E16FB3-30CB-4DB9-94B7-0381423ACF65}"/>
+              </a:ext>
+            </a:extLst>
+          </p:cNvPr>
+          <p:cNvCxnSpPr/>
+          <p:nvPr/>
+        </p:nvCxnSpPr>
+        <p:spPr>
+          <a:xfrm flipH="1">
+            <a:off x="4487537" y="2310787"/>
+            <a:ext cx="4327793" cy="666520"/>
+          </a:xfrm>
+          <a:prstGeom prst="straightConnector1">
+            <a:avLst/>
+          </a:prstGeom>
+          <a:ln>
+            <a:tailEnd type="triangle"/>
+          </a:ln>
+        </p:spPr>
+        <p:style>
+          <a:lnRef idx="1">
+            <a:schemeClr val="accent1"/>
+          </a:lnRef>
+          <a:fillRef idx="0">
+            <a:schemeClr val="accent1"/>
+          </a:fillRef>
+          <a:effectRef idx="0">
+            <a:schemeClr val="accent1"/>
+          </a:effectRef>
+          <a:fontRef idx="minor">
+            <a:schemeClr val="tx1"/>
+          </a:fontRef>
+        </p:style>
+      </p:cxnSp>
+    </p:spTree>
+    <p:extLst>
+      <p:ext uri="{BB962C8B-B14F-4D97-AF65-F5344CB8AC3E}">
+        <p14:creationId xmlns:p14="http://schemas.microsoft.com/office/powerpoint/2010/main" val="328633177"/>
+      </p:ext>
+    </p:extLst>
+  </p:cSld>
+  <p:clrMapOvr>
+    <a:masterClrMapping/>
+  </p:clrMapOvr>
+</p:sld>
+</file>
+
+<file path=ppt/slides/slide8.xml><?xml version="1.0" encoding="utf-8"?>
+<p:sld xmlns:a="http://schemas.openxmlformats.org/drawingml/2006/main" xmlns:r="http://schemas.openxmlformats.org/officeDocument/2006/relationships" xmlns:p="http://schemas.openxmlformats.org/presentationml/2006/main">
+  <p:cSld>
+    <p:bg>
+      <p:bgPr>
+        <a:solidFill>
+          <a:schemeClr val="bg1"/>
+        </a:solidFill>
+        <a:effectLst/>
+      </p:bgPr>
+    </p:bg>
+    <p:spTree>
+      <p:nvGrpSpPr>
+        <p:cNvPr id="1" name=""/>
+        <p:cNvGrpSpPr/>
+        <p:nvPr/>
+      </p:nvGrpSpPr>
+      <p:grpSpPr>
+        <a:xfrm>
+          <a:off x="0" y="0"/>
+          <a:ext cx="0" cy="0"/>
+          <a:chOff x="0" y="0"/>
+          <a:chExt cx="0" cy="0"/>
+        </a:xfrm>
+      </p:grpSpPr>
+      <p:sp>
+        <p:nvSpPr>
+          <p:cNvPr id="35" name="Rectangle 34">
+            <a:extLst>
+              <a:ext uri="{FF2B5EF4-FFF2-40B4-BE49-F238E27FC236}">
+                <a16:creationId xmlns:a16="http://schemas.microsoft.com/office/drawing/2014/main" id="{35555856-9970-4BC3-9AA9-6A917F53AFBD}"/>
+              </a:ext>
+              <a:ext uri="{C183D7F6-B498-43B3-948B-1728B52AA6E4}">
+                <adec:decorative xmlns:adec="http://schemas.microsoft.com/office/drawing/2017/decorative" val="1"/>
+              </a:ext>
+            </a:extLst>
+          </p:cNvPr>
+          <p:cNvSpPr>
+            <a:spLocks noGrp="1" noRot="1" noChangeAspect="1" noMove="1" noResize="1" noEditPoints="1" noAdjustHandles="1" noChangeArrowheads="1" noChangeShapeType="1" noTextEdit="1"/>
+          </p:cNvSpPr>
+          <p:nvPr>
+            <p:extLst>
+              <p:ext uri="{386F3935-93C4-4BCD-93E2-E3B085C9AB24}">
+                <p16:designElem xmlns:p16="http://schemas.microsoft.com/office/powerpoint/2015/main" val="1"/>
+              </p:ext>
+            </p:extLst>
+          </p:nvPr>
+        </p:nvSpPr>
+        <p:spPr>
+          <a:xfrm>
+            <a:off x="5769972" y="0"/>
+            <a:ext cx="6421721" cy="6858000"/>
+          </a:xfrm>
+          <a:prstGeom prst="rect">
+            <a:avLst/>
+          </a:prstGeom>
+          <a:gradFill>
+            <a:gsLst>
+              <a:gs pos="0">
+                <a:schemeClr val="accent1">
+                  <a:lumMod val="100000"/>
+                  <a:alpha val="82000"/>
+                </a:schemeClr>
+              </a:gs>
+              <a:gs pos="25000">
+                <a:schemeClr val="accent1">
+                  <a:alpha val="60000"/>
+                </a:schemeClr>
+              </a:gs>
+              <a:gs pos="94000">
+                <a:schemeClr val="bg2">
+                  <a:lumMod val="75000"/>
+                </a:schemeClr>
+              </a:gs>
+              <a:gs pos="100000">
+                <a:schemeClr val="bg2">
+                  <a:lumMod val="75000"/>
+                </a:schemeClr>
+              </a:gs>
+            </a:gsLst>
+            <a:lin ang="4200000" scaled="0"/>
+          </a:gradFill>
+          <a:ln>
+            <a:noFill/>
+          </a:ln>
+        </p:spPr>
+        <p:style>
+          <a:lnRef idx="2">
+            <a:schemeClr val="accent1">
+              <a:shade val="50000"/>
+            </a:schemeClr>
+          </a:lnRef>
+          <a:fillRef idx="1">
+            <a:schemeClr val="accent1"/>
+          </a:fillRef>
+          <a:effectRef idx="0">
+            <a:schemeClr val="accent1"/>
+          </a:effectRef>
+          <a:fontRef idx="minor">
+            <a:schemeClr val="lt1"/>
+          </a:fontRef>
+        </p:style>
+        <p:txBody>
+          <a:bodyPr rtlCol="0" anchor="ctr"/>
+          <a:lstStyle/>
+          <a:p>
+            <a:pPr algn="ctr"/>
+            <a:endParaRPr lang="en-US"/>
+          </a:p>
+        </p:txBody>
+      </p:sp>
+      <p:pic>
+        <p:nvPicPr>
+          <p:cNvPr id="37" name="Picture 36">
+            <a:extLst>
+              <a:ext uri="{FF2B5EF4-FFF2-40B4-BE49-F238E27FC236}">
+                <a16:creationId xmlns:a16="http://schemas.microsoft.com/office/drawing/2014/main" id="{7F487851-BFAF-46D8-A1ED-50CAD6E46F59}"/>
+              </a:ext>
+              <a:ext uri="{C183D7F6-B498-43B3-948B-1728B52AA6E4}">
+                <adec:decorative xmlns:adec="http://schemas.microsoft.com/office/drawing/2017/decorative" val="1"/>
+              </a:ext>
+            </a:extLst>
+          </p:cNvPr>
+          <p:cNvPicPr>
+            <a:picLocks noGrp="1" noRot="1" noChangeAspect="1" noMove="1" noResize="1" noEditPoints="1" noAdjustHandles="1" noChangeArrowheads="1" noChangeShapeType="1" noCrop="1"/>
+          </p:cNvPicPr>
+          <p:nvPr>
+            <p:extLst>
+              <p:ext uri="{386F3935-93C4-4BCD-93E2-E3B085C9AB24}">
+                <p16:designElem xmlns:p16="http://schemas.microsoft.com/office/powerpoint/2015/main" val="1"/>
+              </p:ext>
+            </p:extLst>
+          </p:nvPr>
+        </p:nvPicPr>
+        <p:blipFill>
+          <a:blip r:embed="rId2">
+            <a:extLst>
+              <a:ext uri="{28A0092B-C50C-407E-A947-70E740481C1C}">
+                <a14:useLocalDpi xmlns:a14="http://schemas.microsoft.com/office/drawing/2010/main" val="0"/>
+              </a:ext>
+            </a:extLst>
+          </a:blip>
+          <a:stretch>
+            <a:fillRect/>
+          </a:stretch>
+        </p:blipFill>
+        <p:spPr>
+          <a:xfrm flipH="1">
+            <a:off x="0" y="0"/>
+            <a:ext cx="12192000" cy="6858000"/>
+          </a:xfrm>
+          <a:prstGeom prst="rect">
+            <a:avLst/>
+          </a:prstGeom>
+        </p:spPr>
+      </p:pic>
+      <p:sp>
+        <p:nvSpPr>
+          <p:cNvPr id="2" name="Title 1">
+            <a:extLst>
+              <a:ext uri="{FF2B5EF4-FFF2-40B4-BE49-F238E27FC236}">
+                <a16:creationId xmlns:a16="http://schemas.microsoft.com/office/drawing/2014/main" id="{FD142945-A795-4FB6-8E66-AAB2150E20F8}"/>
+              </a:ext>
+            </a:extLst>
+          </p:cNvPr>
+          <p:cNvSpPr>
+            <a:spLocks noGrp="1"/>
+          </p:cNvSpPr>
+          <p:nvPr>
+            <p:ph type="title"/>
+          </p:nvPr>
+        </p:nvSpPr>
+        <p:spPr>
+          <a:xfrm>
+            <a:off x="804484" y="4267832"/>
+            <a:ext cx="4805996" cy="1297115"/>
+          </a:xfrm>
+        </p:spPr>
+        <p:txBody>
+          <a:bodyPr vert="horz" lIns="91440" tIns="45720" rIns="91440" bIns="45720" rtlCol="0" anchor="t">
+            <a:normAutofit/>
+          </a:bodyPr>
+          <a:lstStyle/>
+          <a:p>
+            <a:r>
+              <a:rPr lang="en-US" sz="4100" kern="1200">
+                <a:solidFill>
+                  <a:srgbClr val="000000"/>
+                </a:solidFill>
+                <a:latin typeface="+mj-lt"/>
+                <a:ea typeface="+mj-ea"/>
+                <a:cs typeface="+mj-cs"/>
+              </a:rPr>
+              <a:t>Radioactive Graph</a:t>
+            </a:r>
+            <a:r>
+              <a:rPr lang="en-US" sz="4100" kern="1200" dirty="0">
+                <a:solidFill>
+                  <a:srgbClr val="000000"/>
+                </a:solidFill>
+                <a:latin typeface="+mj-lt"/>
+                <a:ea typeface="+mj-ea"/>
+                <a:cs typeface="+mj-cs"/>
+              </a:rPr>
+              <a:t> Screen</a:t>
+            </a:r>
+          </a:p>
+        </p:txBody>
+      </p:sp>
+      <p:sp>
+        <p:nvSpPr>
+          <p:cNvPr id="39" name="Freeform 50">
+            <a:extLst>
+              <a:ext uri="{FF2B5EF4-FFF2-40B4-BE49-F238E27FC236}">
+                <a16:creationId xmlns:a16="http://schemas.microsoft.com/office/drawing/2014/main" id="{13722DD7-BA73-4776-93A3-94491FEF7260}"/>
+              </a:ext>
+              <a:ext uri="{C183D7F6-B498-43B3-948B-1728B52AA6E4}">
+                <adec:decorative xmlns:adec="http://schemas.microsoft.com/office/drawing/2017/decorative" val="1"/>
+              </a:ext>
+            </a:extLst>
+          </p:cNvPr>
+          <p:cNvSpPr>
+            <a:spLocks noGrp="1" noRot="1" noChangeAspect="1" noMove="1" noResize="1" noEditPoints="1" noAdjustHandles="1" noChangeArrowheads="1" noChangeShapeType="1" noTextEdit="1"/>
+          </p:cNvSpPr>
+          <p:nvPr>
+            <p:extLst>
+              <p:ext uri="{386F3935-93C4-4BCD-93E2-E3B085C9AB24}">
+                <p16:designElem xmlns:p16="http://schemas.microsoft.com/office/powerpoint/2015/main" val="1"/>
+              </p:ext>
+            </p:extLst>
+          </p:nvPr>
+        </p:nvSpPr>
+        <p:spPr>
+          <a:xfrm>
+            <a:off x="6727121" y="581159"/>
+            <a:ext cx="5464879" cy="6276841"/>
+          </a:xfrm>
+          <a:custGeom>
+            <a:avLst/>
+            <a:gdLst>
+              <a:gd name="connsiteX0" fmla="*/ 3299930 w 5464879"/>
+              <a:gd name="connsiteY0" fmla="*/ 0 h 6276841"/>
+              <a:gd name="connsiteX1" fmla="*/ 5398992 w 5464879"/>
+              <a:gd name="connsiteY1" fmla="*/ 753544 h 6276841"/>
+              <a:gd name="connsiteX2" fmla="*/ 5464879 w 5464879"/>
+              <a:gd name="connsiteY2" fmla="*/ 813426 h 6276841"/>
+              <a:gd name="connsiteX3" fmla="*/ 5464879 w 5464879"/>
+              <a:gd name="connsiteY3" fmla="*/ 5786434 h 6276841"/>
+              <a:gd name="connsiteX4" fmla="*/ 5398992 w 5464879"/>
+              <a:gd name="connsiteY4" fmla="*/ 5846317 h 6276841"/>
+              <a:gd name="connsiteX5" fmla="*/ 4872873 w 5464879"/>
+              <a:gd name="connsiteY5" fmla="*/ 6201577 h 6276841"/>
+              <a:gd name="connsiteX6" fmla="*/ 4716632 w 5464879"/>
+              <a:gd name="connsiteY6" fmla="*/ 6276841 h 6276841"/>
+              <a:gd name="connsiteX7" fmla="*/ 1883227 w 5464879"/>
+              <a:gd name="connsiteY7" fmla="*/ 6276841 h 6276841"/>
+              <a:gd name="connsiteX8" fmla="*/ 1726987 w 5464879"/>
+              <a:gd name="connsiteY8" fmla="*/ 6201577 h 6276841"/>
+              <a:gd name="connsiteX9" fmla="*/ 0 w 5464879"/>
+              <a:gd name="connsiteY9" fmla="*/ 3299930 h 6276841"/>
+              <a:gd name="connsiteX10" fmla="*/ 3299930 w 5464879"/>
+              <a:gd name="connsiteY10" fmla="*/ 0 h 6276841"/>
+            </a:gdLst>
+            <a:ahLst/>
+            <a:cxnLst>
+              <a:cxn ang="0">
+                <a:pos x="connsiteX0" y="connsiteY0"/>
+              </a:cxn>
+              <a:cxn ang="0">
+                <a:pos x="connsiteX1" y="connsiteY1"/>
+              </a:cxn>
+              <a:cxn ang="0">
+                <a:pos x="connsiteX2" y="connsiteY2"/>
+              </a:cxn>
+              <a:cxn ang="0">
+                <a:pos x="connsiteX3" y="connsiteY3"/>
+              </a:cxn>
+              <a:cxn ang="0">
+                <a:pos x="connsiteX4" y="connsiteY4"/>
+              </a:cxn>
+              <a:cxn ang="0">
+                <a:pos x="connsiteX5" y="connsiteY5"/>
+              </a:cxn>
+              <a:cxn ang="0">
+                <a:pos x="connsiteX6" y="connsiteY6"/>
+              </a:cxn>
+              <a:cxn ang="0">
+                <a:pos x="connsiteX7" y="connsiteY7"/>
+              </a:cxn>
+              <a:cxn ang="0">
+                <a:pos x="connsiteX8" y="connsiteY8"/>
+              </a:cxn>
+              <a:cxn ang="0">
+                <a:pos x="connsiteX9" y="connsiteY9"/>
+              </a:cxn>
+              <a:cxn ang="0">
+                <a:pos x="connsiteX10" y="connsiteY10"/>
+              </a:cxn>
+            </a:cxnLst>
+            <a:rect l="l" t="t" r="r" b="b"/>
+            <a:pathLst>
+              <a:path w="5464879" h="6276841">
+                <a:moveTo>
+                  <a:pt x="3299930" y="0"/>
+                </a:moveTo>
+                <a:cubicBezTo>
+                  <a:pt x="4097274" y="0"/>
+                  <a:pt x="4828569" y="282789"/>
+                  <a:pt x="5398992" y="753544"/>
+                </a:cubicBezTo>
+                <a:lnTo>
+                  <a:pt x="5464879" y="813426"/>
+                </a:lnTo>
+                <a:lnTo>
+                  <a:pt x="5464879" y="5786434"/>
+                </a:lnTo>
+                <a:lnTo>
+                  <a:pt x="5398992" y="5846317"/>
+                </a:lnTo>
+                <a:cubicBezTo>
+                  <a:pt x="5236014" y="5980818"/>
+                  <a:pt x="5059904" y="6099975"/>
+                  <a:pt x="4872873" y="6201577"/>
+                </a:cubicBezTo>
+                <a:lnTo>
+                  <a:pt x="4716632" y="6276841"/>
+                </a:lnTo>
+                <a:lnTo>
+                  <a:pt x="1883227" y="6276841"/>
+                </a:lnTo>
+                <a:lnTo>
+                  <a:pt x="1726987" y="6201577"/>
+                </a:lnTo>
+                <a:cubicBezTo>
+                  <a:pt x="698316" y="5642769"/>
+                  <a:pt x="0" y="4552900"/>
+                  <a:pt x="0" y="3299930"/>
+                </a:cubicBezTo>
+                <a:cubicBezTo>
+                  <a:pt x="0" y="1477429"/>
+                  <a:pt x="1477429" y="0"/>
+                  <a:pt x="3299930" y="0"/>
+                </a:cubicBezTo>
+                <a:close/>
+              </a:path>
+            </a:pathLst>
+          </a:custGeom>
+          <a:solidFill>
+            <a:srgbClr val="FFFFFF"/>
+          </a:solidFill>
+          <a:ln>
+            <a:gradFill>
+              <a:gsLst>
+                <a:gs pos="0">
+                  <a:schemeClr val="accent1">
+                    <a:lumMod val="40000"/>
+                    <a:lumOff val="60000"/>
+                  </a:schemeClr>
+                </a:gs>
+                <a:gs pos="23000">
+                  <a:schemeClr val="accent1">
+                    <a:lumMod val="45000"/>
+                    <a:lumOff val="55000"/>
+                  </a:schemeClr>
+                </a:gs>
+                <a:gs pos="83000">
+                  <a:schemeClr val="bg2">
+                    <a:lumMod val="75000"/>
+                  </a:schemeClr>
+                </a:gs>
+                <a:gs pos="100000">
+                  <a:schemeClr val="bg2">
+                    <a:lumMod val="75000"/>
+                  </a:schemeClr>
+                </a:gs>
+              </a:gsLst>
+              <a:lin ang="5400000" scaled="1"/>
+            </a:gradFill>
+          </a:ln>
+        </p:spPr>
+        <p:style>
+          <a:lnRef idx="2">
+            <a:schemeClr val="accent1">
+              <a:shade val="50000"/>
+            </a:schemeClr>
+          </a:lnRef>
+          <a:fillRef idx="1">
+            <a:schemeClr val="accent1"/>
+          </a:fillRef>
+          <a:effectRef idx="0">
+            <a:schemeClr val="accent1"/>
+          </a:effectRef>
+          <a:fontRef idx="minor">
+            <a:schemeClr val="lt1"/>
+          </a:fontRef>
+        </p:style>
+        <p:txBody>
+          <a:bodyPr wrap="square" rtlCol="0" anchor="ctr">
+            <a:noAutofit/>
+          </a:bodyPr>
+          <a:lstStyle/>
+          <a:p>
+            <a:pPr algn="ctr"/>
+            <a:endParaRPr lang="en-US"/>
+          </a:p>
+        </p:txBody>
+      </p:sp>
+      <p:pic>
+        <p:nvPicPr>
+          <p:cNvPr id="4" name="Picture 4" descr="A picture containing device, meter&#10;&#10;Description generated with high confidence">
+            <a:extLst>
+              <a:ext uri="{FF2B5EF4-FFF2-40B4-BE49-F238E27FC236}">
+                <a16:creationId xmlns:a16="http://schemas.microsoft.com/office/drawing/2014/main" id="{E92E6C63-A453-44F5-8DF1-66C927D5AE3B}"/>
+              </a:ext>
+            </a:extLst>
+          </p:cNvPr>
+          <p:cNvPicPr>
+            <a:picLocks noChangeAspect="1"/>
+          </p:cNvPicPr>
+          <p:nvPr/>
+        </p:nvPicPr>
+        <p:blipFill>
+          <a:blip r:embed="rId3"/>
+          <a:stretch>
+            <a:fillRect/>
+          </a:stretch>
+        </p:blipFill>
+        <p:spPr>
+          <a:xfrm>
+            <a:off x="8653355" y="1697277"/>
+            <a:ext cx="2254590" cy="4377846"/>
+          </a:xfrm>
+          <a:prstGeom prst="rect">
+            <a:avLst/>
+          </a:prstGeom>
+        </p:spPr>
+      </p:pic>
+    </p:spTree>
+    <p:extLst>
+      <p:ext uri="{BB962C8B-B14F-4D97-AF65-F5344CB8AC3E}">
+        <p14:creationId xmlns:p14="http://schemas.microsoft.com/office/powerpoint/2010/main" val="1256918456"/>
+      </p:ext>
+    </p:extLst>
+  </p:cSld>
+  <p:clrMapOvr>
+    <a:masterClrMapping/>
+  </p:clrMapOvr>
+</p:sld>
+</file>
+
+<file path=ppt/slides/slide9.xml><?xml version="1.0" encoding="utf-8"?>
+<p:sld xmlns:a="http://schemas.openxmlformats.org/drawingml/2006/main" xmlns:r="http://schemas.openxmlformats.org/officeDocument/2006/relationships" xmlns:p="http://schemas.openxmlformats.org/presentationml/2006/main">
+  <p:cSld>
+    <p:bg>
+      <p:bgPr>
+        <a:solidFill>
+          <a:schemeClr val="bg1"/>
+        </a:solidFill>
+        <a:effectLst/>
+      </p:bgPr>
+    </p:bg>
+    <p:spTree>
+      <p:nvGrpSpPr>
+        <p:cNvPr id="1" name=""/>
+        <p:cNvGrpSpPr/>
+        <p:nvPr/>
+      </p:nvGrpSpPr>
+      <p:grpSpPr>
+        <a:xfrm>
+          <a:off x="0" y="0"/>
+          <a:ext cx="0" cy="0"/>
+          <a:chOff x="0" y="0"/>
+          <a:chExt cx="0" cy="0"/>
+        </a:xfrm>
+      </p:grpSpPr>
+      <p:sp>
+        <p:nvSpPr>
+          <p:cNvPr id="35" name="Rectangle 34">
+            <a:extLst>
+              <a:ext uri="{FF2B5EF4-FFF2-40B4-BE49-F238E27FC236}">
+                <a16:creationId xmlns:a16="http://schemas.microsoft.com/office/drawing/2014/main" id="{35555856-9970-4BC3-9AA9-6A917F53AFBD}"/>
+              </a:ext>
+              <a:ext uri="{C183D7F6-B498-43B3-948B-1728B52AA6E4}">
+                <adec:decorative xmlns:adec="http://schemas.microsoft.com/office/drawing/2017/decorative" val="1"/>
+              </a:ext>
+            </a:extLst>
+          </p:cNvPr>
+          <p:cNvSpPr>
+            <a:spLocks noGrp="1" noRot="1" noChangeAspect="1" noMove="1" noResize="1" noEditPoints="1" noAdjustHandles="1" noChangeArrowheads="1" noChangeShapeType="1" noTextEdit="1"/>
+          </p:cNvSpPr>
+          <p:nvPr>
+            <p:extLst>
+              <p:ext uri="{386F3935-93C4-4BCD-93E2-E3B085C9AB24}">
+                <p16:designElem xmlns:p16="http://schemas.microsoft.com/office/powerpoint/2015/main" val="1"/>
+              </p:ext>
+            </p:extLst>
+          </p:nvPr>
+        </p:nvSpPr>
+        <p:spPr>
+          <a:xfrm>
+            <a:off x="5769972" y="0"/>
+            <a:ext cx="6421721" cy="6858000"/>
+          </a:xfrm>
+          <a:prstGeom prst="rect">
+            <a:avLst/>
+          </a:prstGeom>
+          <a:gradFill>
+            <a:gsLst>
+              <a:gs pos="0">
+                <a:schemeClr val="accent1">
+                  <a:lumMod val="100000"/>
+                  <a:alpha val="82000"/>
+                </a:schemeClr>
+              </a:gs>
+              <a:gs pos="25000">
+                <a:schemeClr val="accent1">
+                  <a:alpha val="60000"/>
+                </a:schemeClr>
+              </a:gs>
+              <a:gs pos="94000">
+                <a:schemeClr val="bg2">
+                  <a:lumMod val="75000"/>
+                </a:schemeClr>
+              </a:gs>
+              <a:gs pos="100000">
+                <a:schemeClr val="bg2">
+                  <a:lumMod val="75000"/>
+                </a:schemeClr>
+              </a:gs>
+            </a:gsLst>
+            <a:lin ang="4200000" scaled="0"/>
+          </a:gradFill>
+          <a:ln>
+            <a:noFill/>
+          </a:ln>
+        </p:spPr>
+        <p:style>
+          <a:lnRef idx="2">
+            <a:schemeClr val="accent1">
+              <a:shade val="50000"/>
+            </a:schemeClr>
+          </a:lnRef>
+          <a:fillRef idx="1">
+            <a:schemeClr val="accent1"/>
+          </a:fillRef>
+          <a:effectRef idx="0">
+            <a:schemeClr val="accent1"/>
+          </a:effectRef>
+          <a:fontRef idx="minor">
+            <a:schemeClr val="lt1"/>
+          </a:fontRef>
+        </p:style>
+        <p:txBody>
+          <a:bodyPr rtlCol="0" anchor="ctr"/>
+          <a:lstStyle/>
+          <a:p>
+            <a:pPr algn="ctr"/>
+            <a:endParaRPr lang="en-US"/>
+          </a:p>
+        </p:txBody>
+      </p:sp>
+      <p:pic>
+        <p:nvPicPr>
+          <p:cNvPr id="37" name="Picture 36">
+            <a:extLst>
+              <a:ext uri="{FF2B5EF4-FFF2-40B4-BE49-F238E27FC236}">
+                <a16:creationId xmlns:a16="http://schemas.microsoft.com/office/drawing/2014/main" id="{7F487851-BFAF-46D8-A1ED-50CAD6E46F59}"/>
+              </a:ext>
+              <a:ext uri="{C183D7F6-B498-43B3-948B-1728B52AA6E4}">
+                <adec:decorative xmlns:adec="http://schemas.microsoft.com/office/drawing/2017/decorative" val="1"/>
+              </a:ext>
+            </a:extLst>
+          </p:cNvPr>
+          <p:cNvPicPr>
+            <a:picLocks noGrp="1" noRot="1" noChangeAspect="1" noMove="1" noResize="1" noEditPoints="1" noAdjustHandles="1" noChangeArrowheads="1" noChangeShapeType="1" noCrop="1"/>
+          </p:cNvPicPr>
+          <p:nvPr>
+            <p:extLst>
+              <p:ext uri="{386F3935-93C4-4BCD-93E2-E3B085C9AB24}">
+                <p16:designElem xmlns:p16="http://schemas.microsoft.com/office/powerpoint/2015/main" val="1"/>
+              </p:ext>
+            </p:extLst>
+          </p:nvPr>
+        </p:nvPicPr>
+        <p:blipFill>
+          <a:blip r:embed="rId2">
+            <a:extLst>
+              <a:ext uri="{28A0092B-C50C-407E-A947-70E740481C1C}">
+                <a14:useLocalDpi xmlns:a14="http://schemas.microsoft.com/office/drawing/2010/main" val="0"/>
+              </a:ext>
+            </a:extLst>
+          </a:blip>
+          <a:stretch>
+            <a:fillRect/>
+          </a:stretch>
+        </p:blipFill>
+        <p:spPr>
+          <a:xfrm flipH="1">
+            <a:off x="0" y="0"/>
+            <a:ext cx="12192000" cy="6858000"/>
+          </a:xfrm>
+          <a:prstGeom prst="rect">
+            <a:avLst/>
+          </a:prstGeom>
+        </p:spPr>
+      </p:pic>
+      <p:sp>
+        <p:nvSpPr>
+          <p:cNvPr id="39" name="Freeform 50">
+            <a:extLst>
+              <a:ext uri="{FF2B5EF4-FFF2-40B4-BE49-F238E27FC236}">
+                <a16:creationId xmlns:a16="http://schemas.microsoft.com/office/drawing/2014/main" id="{13722DD7-BA73-4776-93A3-94491FEF7260}"/>
+              </a:ext>
+              <a:ext uri="{C183D7F6-B498-43B3-948B-1728B52AA6E4}">
+                <adec:decorative xmlns:adec="http://schemas.microsoft.com/office/drawing/2017/decorative" val="1"/>
+              </a:ext>
+            </a:extLst>
+          </p:cNvPr>
+          <p:cNvSpPr>
+            <a:spLocks noGrp="1" noRot="1" noChangeAspect="1" noMove="1" noResize="1" noEditPoints="1" noAdjustHandles="1" noChangeArrowheads="1" noChangeShapeType="1" noTextEdit="1"/>
+          </p:cNvSpPr>
+          <p:nvPr>
+            <p:extLst>
+              <p:ext uri="{386F3935-93C4-4BCD-93E2-E3B085C9AB24}">
+                <p16:designElem xmlns:p16="http://schemas.microsoft.com/office/powerpoint/2015/main" val="1"/>
+              </p:ext>
+            </p:extLst>
+          </p:nvPr>
+        </p:nvSpPr>
+        <p:spPr>
+          <a:xfrm>
+            <a:off x="6727121" y="581159"/>
+            <a:ext cx="5464879" cy="6276841"/>
+          </a:xfrm>
+          <a:custGeom>
+            <a:avLst/>
+            <a:gdLst>
+              <a:gd name="connsiteX0" fmla="*/ 3299930 w 5464879"/>
+              <a:gd name="connsiteY0" fmla="*/ 0 h 6276841"/>
+              <a:gd name="connsiteX1" fmla="*/ 5398992 w 5464879"/>
+              <a:gd name="connsiteY1" fmla="*/ 753544 h 6276841"/>
+              <a:gd name="connsiteX2" fmla="*/ 5464879 w 5464879"/>
+              <a:gd name="connsiteY2" fmla="*/ 813426 h 6276841"/>
+              <a:gd name="connsiteX3" fmla="*/ 5464879 w 5464879"/>
+              <a:gd name="connsiteY3" fmla="*/ 5786434 h 6276841"/>
+              <a:gd name="connsiteX4" fmla="*/ 5398992 w 5464879"/>
+              <a:gd name="connsiteY4" fmla="*/ 5846317 h 6276841"/>
+              <a:gd name="connsiteX5" fmla="*/ 4872873 w 5464879"/>
+              <a:gd name="connsiteY5" fmla="*/ 6201577 h 6276841"/>
+              <a:gd name="connsiteX6" fmla="*/ 4716632 w 5464879"/>
+              <a:gd name="connsiteY6" fmla="*/ 6276841 h 6276841"/>
+              <a:gd name="connsiteX7" fmla="*/ 1883227 w 5464879"/>
+              <a:gd name="connsiteY7" fmla="*/ 6276841 h 6276841"/>
+              <a:gd name="connsiteX8" fmla="*/ 1726987 w 5464879"/>
+              <a:gd name="connsiteY8" fmla="*/ 6201577 h 6276841"/>
+              <a:gd name="connsiteX9" fmla="*/ 0 w 5464879"/>
+              <a:gd name="connsiteY9" fmla="*/ 3299930 h 6276841"/>
+              <a:gd name="connsiteX10" fmla="*/ 3299930 w 5464879"/>
+              <a:gd name="connsiteY10" fmla="*/ 0 h 6276841"/>
+            </a:gdLst>
+            <a:ahLst/>
+            <a:cxnLst>
+              <a:cxn ang="0">
+                <a:pos x="connsiteX0" y="connsiteY0"/>
+              </a:cxn>
+              <a:cxn ang="0">
+                <a:pos x="connsiteX1" y="connsiteY1"/>
+              </a:cxn>
+              <a:cxn ang="0">
+                <a:pos x="connsiteX2" y="connsiteY2"/>
+              </a:cxn>
+              <a:cxn ang="0">
+                <a:pos x="connsiteX3" y="connsiteY3"/>
+              </a:cxn>
+              <a:cxn ang="0">
+                <a:pos x="connsiteX4" y="connsiteY4"/>
+              </a:cxn>
+              <a:cxn ang="0">
+                <a:pos x="connsiteX5" y="connsiteY5"/>
+              </a:cxn>
+              <a:cxn ang="0">
+                <a:pos x="connsiteX6" y="connsiteY6"/>
+              </a:cxn>
+              <a:cxn ang="0">
+                <a:pos x="connsiteX7" y="connsiteY7"/>
+              </a:cxn>
+              <a:cxn ang="0">
+                <a:pos x="connsiteX8" y="connsiteY8"/>
+              </a:cxn>
+              <a:cxn ang="0">
+                <a:pos x="connsiteX9" y="connsiteY9"/>
+              </a:cxn>
+              <a:cxn ang="0">
+                <a:pos x="connsiteX10" y="connsiteY10"/>
+              </a:cxn>
+            </a:cxnLst>
+            <a:rect l="l" t="t" r="r" b="b"/>
+            <a:pathLst>
+              <a:path w="5464879" h="6276841">
+                <a:moveTo>
+                  <a:pt x="3299930" y="0"/>
+                </a:moveTo>
+                <a:cubicBezTo>
+                  <a:pt x="4097274" y="0"/>
+                  <a:pt x="4828569" y="282789"/>
+                  <a:pt x="5398992" y="753544"/>
+                </a:cubicBezTo>
+                <a:lnTo>
+                  <a:pt x="5464879" y="813426"/>
+                </a:lnTo>
+                <a:lnTo>
+                  <a:pt x="5464879" y="5786434"/>
+                </a:lnTo>
+                <a:lnTo>
+                  <a:pt x="5398992" y="5846317"/>
+                </a:lnTo>
+                <a:cubicBezTo>
+                  <a:pt x="5236014" y="5980818"/>
+                  <a:pt x="5059904" y="6099975"/>
+                  <a:pt x="4872873" y="6201577"/>
+                </a:cubicBezTo>
+                <a:lnTo>
+                  <a:pt x="4716632" y="6276841"/>
+                </a:lnTo>
+                <a:lnTo>
+                  <a:pt x="1883227" y="6276841"/>
+                </a:lnTo>
+                <a:lnTo>
+                  <a:pt x="1726987" y="6201577"/>
+                </a:lnTo>
+                <a:cubicBezTo>
+                  <a:pt x="698316" y="5642769"/>
+                  <a:pt x="0" y="4552900"/>
+                  <a:pt x="0" y="3299930"/>
+                </a:cubicBezTo>
+                <a:cubicBezTo>
+                  <a:pt x="0" y="1477429"/>
+                  <a:pt x="1477429" y="0"/>
+                  <a:pt x="3299930" y="0"/>
+                </a:cubicBezTo>
+                <a:close/>
+              </a:path>
+            </a:pathLst>
+          </a:custGeom>
+          <a:solidFill>
+            <a:srgbClr val="FFFFFF"/>
+          </a:solidFill>
+          <a:ln>
+            <a:gradFill>
+              <a:gsLst>
+                <a:gs pos="0">
+                  <a:schemeClr val="accent1">
+                    <a:lumMod val="40000"/>
+                    <a:lumOff val="60000"/>
+                  </a:schemeClr>
+                </a:gs>
+                <a:gs pos="23000">
+                  <a:schemeClr val="accent1">
+                    <a:lumMod val="45000"/>
+                    <a:lumOff val="55000"/>
+                  </a:schemeClr>
+                </a:gs>
+                <a:gs pos="83000">
+                  <a:schemeClr val="bg2">
+                    <a:lumMod val="75000"/>
+                  </a:schemeClr>
+                </a:gs>
+                <a:gs pos="100000">
+                  <a:schemeClr val="bg2">
+                    <a:lumMod val="75000"/>
+                  </a:schemeClr>
+                </a:gs>
+              </a:gsLst>
+              <a:lin ang="5400000" scaled="1"/>
+            </a:gradFill>
+          </a:ln>
+        </p:spPr>
+        <p:style>
+          <a:lnRef idx="2">
+            <a:schemeClr val="accent1">
+              <a:shade val="50000"/>
+            </a:schemeClr>
+          </a:lnRef>
+          <a:fillRef idx="1">
+            <a:schemeClr val="accent1"/>
+          </a:fillRef>
+          <a:effectRef idx="0">
+            <a:schemeClr val="accent1"/>
+          </a:effectRef>
+          <a:fontRef idx="minor">
+            <a:schemeClr val="lt1"/>
+          </a:fontRef>
+        </p:style>
+        <p:txBody>
+          <a:bodyPr wrap="square" rtlCol="0" anchor="ctr">
+            <a:noAutofit/>
+          </a:bodyPr>
+          <a:lstStyle/>
+          <a:p>
+            <a:pPr algn="ctr"/>
+            <a:endParaRPr lang="en-US"/>
+          </a:p>
+        </p:txBody>
+      </p:sp>
+      <p:pic>
+        <p:nvPicPr>
+          <p:cNvPr id="4" name="Picture 4" descr="A picture containing device, meter&#10;&#10;Description generated with high confidence">
+            <a:extLst>
+              <a:ext uri="{FF2B5EF4-FFF2-40B4-BE49-F238E27FC236}">
+                <a16:creationId xmlns:a16="http://schemas.microsoft.com/office/drawing/2014/main" id="{E92E6C63-A453-44F5-8DF1-66C927D5AE3B}"/>
+              </a:ext>
+            </a:extLst>
+          </p:cNvPr>
+          <p:cNvPicPr>
+            <a:picLocks noChangeAspect="1"/>
+          </p:cNvPicPr>
+          <p:nvPr/>
+        </p:nvPicPr>
+        <p:blipFill>
+          <a:blip r:embed="rId3"/>
+          <a:stretch>
+            <a:fillRect/>
+          </a:stretch>
+        </p:blipFill>
+        <p:spPr>
+          <a:xfrm>
+            <a:off x="8653355" y="1697277"/>
+            <a:ext cx="2254590" cy="4377846"/>
+          </a:xfrm>
+          <a:prstGeom prst="rect">
+            <a:avLst/>
+          </a:prstGeom>
+        </p:spPr>
+      </p:pic>
+      <p:sp>
+        <p:nvSpPr>
+          <p:cNvPr id="6" name="Rectangle: Rounded Corners 5">
+            <a:extLst>
+              <a:ext uri="{FF2B5EF4-FFF2-40B4-BE49-F238E27FC236}">
+                <a16:creationId xmlns:a16="http://schemas.microsoft.com/office/drawing/2014/main" id="{C53A4B25-048A-4155-8A43-85F366D218E4}"/>
+              </a:ext>
+            </a:extLst>
+          </p:cNvPr>
+          <p:cNvSpPr/>
+          <p:nvPr/>
+        </p:nvSpPr>
+        <p:spPr>
+          <a:xfrm>
+            <a:off x="1287137" y="1007125"/>
+            <a:ext cx="2056481" cy="807904"/>
+          </a:xfrm>
+          <a:prstGeom prst="roundRect">
+            <a:avLst/>
+          </a:prstGeom>
+        </p:spPr>
+        <p:style>
+          <a:lnRef idx="2">
+            <a:schemeClr val="accent1">
+              <a:shade val="50000"/>
+            </a:schemeClr>
+          </a:lnRef>
+          <a:fillRef idx="1">
+            <a:schemeClr val="accent1"/>
+          </a:fillRef>
+          <a:effectRef idx="0">
+            <a:schemeClr val="accent1"/>
+          </a:effectRef>
+          <a:fontRef idx="minor">
+            <a:schemeClr val="lt1"/>
+          </a:fontRef>
+        </p:style>
+        <p:txBody>
+          <a:bodyPr rtlCol="0" anchor="ctr"/>
+          <a:lstStyle/>
+          <a:p>
+            <a:pPr algn="ctr"/>
+            <a:r>
+              <a:rPr lang="ko-KR" altLang="en-US" sz="1100">
+                <a:ea typeface="맑은 고딕"/>
+                <a:cs typeface="Calibri"/>
+              </a:rPr>
+              <a:t>이</a:t>
+            </a:r>
+            <a:r>
+              <a:rPr lang="en-US" sz="1100" dirty="0">
+                <a:cs typeface="Calibri"/>
+              </a:rPr>
+              <a:t> </a:t>
+            </a:r>
+            <a:r>
+              <a:rPr lang="ko-KR" altLang="en-US" sz="1100">
+                <a:ea typeface="맑은 고딕"/>
+                <a:cs typeface="Calibri"/>
+              </a:rPr>
+              <a:t>버튼을</a:t>
+            </a:r>
+            <a:r>
+              <a:rPr lang="en-US" sz="1100" dirty="0">
+                <a:cs typeface="Calibri"/>
+              </a:rPr>
+              <a:t> </a:t>
+            </a:r>
+            <a:r>
+              <a:rPr lang="ko-KR" altLang="en-US" sz="1100">
+                <a:ea typeface="맑은 고딕"/>
+                <a:cs typeface="Calibri"/>
+              </a:rPr>
+              <a:t>누르면 Profile Screen 으로 돌아가게 됨</a:t>
+            </a:r>
+            <a:endParaRPr lang="en-US" sz="1100">
+              <a:ea typeface="맑은 고딕"/>
+              <a:cs typeface="Calibri"/>
+            </a:endParaRPr>
+          </a:p>
+        </p:txBody>
+      </p:sp>
+      <p:cxnSp>
+        <p:nvCxnSpPr>
+          <p:cNvPr id="7" name="Straight Arrow Connector 6">
+            <a:extLst>
+              <a:ext uri="{FF2B5EF4-FFF2-40B4-BE49-F238E27FC236}">
+                <a16:creationId xmlns:a16="http://schemas.microsoft.com/office/drawing/2014/main" id="{E13102B1-0E4D-4CBE-B75E-6D50C6920233}"/>
+              </a:ext>
+            </a:extLst>
+          </p:cNvPr>
+          <p:cNvCxnSpPr/>
+          <p:nvPr/>
+        </p:nvCxnSpPr>
+        <p:spPr>
+          <a:xfrm flipH="1" flipV="1">
+            <a:off x="3354291" y="1430928"/>
+            <a:ext cx="5438661" cy="848301"/>
+          </a:xfrm>
+          <a:prstGeom prst="straightConnector1">
+            <a:avLst/>
+          </a:prstGeom>
+          <a:ln>
+            <a:tailEnd type="triangle"/>
+          </a:ln>
+        </p:spPr>
+        <p:style>
+          <a:lnRef idx="1">
+            <a:schemeClr val="accent1"/>
+          </a:lnRef>
+          <a:fillRef idx="0">
+            <a:schemeClr val="accent1"/>
+          </a:fillRef>
+          <a:effectRef idx="0">
+            <a:schemeClr val="accent1"/>
+          </a:effectRef>
+          <a:fontRef idx="minor">
+            <a:schemeClr val="tx1"/>
+          </a:fontRef>
+        </p:style>
+      </p:cxnSp>
+      <p:cxnSp>
+        <p:nvCxnSpPr>
+          <p:cNvPr id="9" name="Straight Arrow Connector 8">
+            <a:extLst>
+              <a:ext uri="{FF2B5EF4-FFF2-40B4-BE49-F238E27FC236}">
+                <a16:creationId xmlns:a16="http://schemas.microsoft.com/office/drawing/2014/main" id="{A8254433-44A1-4384-9002-F1FF79FB73D0}"/>
+              </a:ext>
+            </a:extLst>
+          </p:cNvPr>
+          <p:cNvCxnSpPr/>
+          <p:nvPr/>
+        </p:nvCxnSpPr>
+        <p:spPr>
+          <a:xfrm flipH="1" flipV="1">
+            <a:off x="3805295" y="3158052"/>
+            <a:ext cx="5071431" cy="526974"/>
+          </a:xfrm>
+          <a:prstGeom prst="straightConnector1">
+            <a:avLst/>
+          </a:prstGeom>
+          <a:ln>
+            <a:tailEnd type="triangle"/>
+          </a:ln>
+        </p:spPr>
+        <p:style>
+          <a:lnRef idx="1">
+            <a:schemeClr val="accent1"/>
+          </a:lnRef>
+          <a:fillRef idx="0">
+            <a:schemeClr val="accent1"/>
+          </a:fillRef>
+          <a:effectRef idx="0">
+            <a:schemeClr val="accent1"/>
+          </a:effectRef>
+          <a:fontRef idx="minor">
+            <a:schemeClr val="tx1"/>
+          </a:fontRef>
+        </p:style>
+      </p:cxnSp>
+      <p:sp>
+        <p:nvSpPr>
+          <p:cNvPr id="10" name="Rectangle: Rounded Corners 9">
+            <a:extLst>
+              <a:ext uri="{FF2B5EF4-FFF2-40B4-BE49-F238E27FC236}">
+                <a16:creationId xmlns:a16="http://schemas.microsoft.com/office/drawing/2014/main" id="{F64FD729-6BB7-45F5-930C-1623919589A8}"/>
+              </a:ext>
+            </a:extLst>
+          </p:cNvPr>
+          <p:cNvSpPr/>
+          <p:nvPr/>
+        </p:nvSpPr>
+        <p:spPr>
+          <a:xfrm>
+            <a:off x="1050734" y="2515059"/>
+            <a:ext cx="2745034" cy="1322023"/>
+          </a:xfrm>
+          <a:prstGeom prst="roundRect">
+            <a:avLst/>
+          </a:prstGeom>
+        </p:spPr>
+        <p:style>
+          <a:lnRef idx="2">
+            <a:schemeClr val="accent1">
+              <a:shade val="50000"/>
+            </a:schemeClr>
+          </a:lnRef>
+          <a:fillRef idx="1">
+            <a:schemeClr val="accent1"/>
+          </a:fillRef>
+          <a:effectRef idx="0">
+            <a:schemeClr val="accent1"/>
+          </a:effectRef>
+          <a:fontRef idx="minor">
+            <a:schemeClr val="lt1"/>
+          </a:fontRef>
+        </p:style>
+        <p:txBody>
+          <a:bodyPr rtlCol="0" anchor="ctr"/>
+          <a:lstStyle/>
+          <a:p>
+            <a:pPr algn="ctr"/>
+            <a:endParaRPr lang="en-US"/>
+          </a:p>
+        </p:txBody>
+      </p:sp>
+      <p:sp>
+        <p:nvSpPr>
+          <p:cNvPr id="11" name="TextBox 10">
+            <a:extLst>
+              <a:ext uri="{FF2B5EF4-FFF2-40B4-BE49-F238E27FC236}">
+                <a16:creationId xmlns:a16="http://schemas.microsoft.com/office/drawing/2014/main" id="{D84624AC-183C-4AEA-ABCD-F9A212A09294}"/>
+              </a:ext>
+            </a:extLst>
+          </p:cNvPr>
+          <p:cNvSpPr txBox="1"/>
+          <p:nvPr/>
+        </p:nvSpPr>
+        <p:spPr>
+          <a:xfrm>
+            <a:off x="1050389" y="2730461"/>
+            <a:ext cx="2743199" cy="1107996"/>
+          </a:xfrm>
+          <a:prstGeom prst="rect">
+            <a:avLst/>
+          </a:prstGeom>
+          <a:noFill/>
+        </p:spPr>
+        <p:txBody>
+          <a:bodyPr rot="0" spcFirstLastPara="0" vertOverflow="overflow" horzOverflow="overflow" vert="horz" wrap="square" lIns="91440" tIns="45720" rIns="91440" bIns="45720" numCol="1" spcCol="0" rtlCol="0" fromWordArt="0" anchor="t" anchorCtr="0" forceAA="0" compatLnSpc="1">
+            <a:prstTxWarp prst="textNoShape">
+              <a:avLst/>
+            </a:prstTxWarp>
+            <a:spAutoFit/>
+          </a:bodyPr>
+          <a:lstStyle/>
+          <a:p>
+            <a:r>
+              <a:rPr lang="ko-KR" altLang="en-US" sz="1100" dirty="0">
+                <a:solidFill>
+                  <a:schemeClr val="bg1"/>
+                </a:solidFill>
+                <a:ea typeface="맑은 고딕"/>
+                <a:cs typeface="Calibri"/>
+              </a:rPr>
+              <a:t>현재 측정된 방사능 수치가 어느 수준인지 나타내 주기 위한 차트. 추후에 애니메이션 기능을 사용하기 위해서 </a:t>
+            </a:r>
+            <a:r>
+              <a:rPr lang="ko-KR" altLang="en-US" sz="1100">
+                <a:solidFill>
+                  <a:schemeClr val="bg1"/>
+                </a:solidFill>
+                <a:ea typeface="맑은 고딕"/>
+                <a:cs typeface="Calibri"/>
+              </a:rPr>
+              <a:t>예제와 같은 형태의 이미지를 텅 빈 차트부터 꽉 찬 차트까지 모든 가능한 종류의 이미지가 필요할 것으로 보임.</a:t>
+            </a:r>
+            <a:endParaRPr lang="ko-KR" altLang="en-US" sz="1100" dirty="0">
+              <a:solidFill>
+                <a:schemeClr val="bg1"/>
+              </a:solidFill>
+              <a:ea typeface="맑은 고딕"/>
+              <a:cs typeface="Calibri"/>
+            </a:endParaRPr>
+          </a:p>
+        </p:txBody>
+      </p:sp>
+    </p:spTree>
+    <p:extLst>
+      <p:ext uri="{BB962C8B-B14F-4D97-AF65-F5344CB8AC3E}">
+        <p14:creationId xmlns:p14="http://schemas.microsoft.com/office/powerpoint/2010/main" val="2508555845"/>
       </p:ext>
     </p:extLst>
   </p:cSld>

</xml_diff>